<commit_message>
Added report and presentation
</commit_message>
<xml_diff>
--- a/Presentation/GrandFinale.pptx
+++ b/Presentation/GrandFinale.pptx
@@ -5,10 +5,10 @@
     <p:sldMasterId id="2147483723" r:id="rId4"/>
   </p:sldMasterIdLst>
   <p:notesMasterIdLst>
-    <p:notesMasterId r:id="rId18"/>
+    <p:notesMasterId r:id="rId20"/>
   </p:notesMasterIdLst>
   <p:handoutMasterIdLst>
-    <p:handoutMasterId r:id="rId19"/>
+    <p:handoutMasterId r:id="rId21"/>
   </p:handoutMasterIdLst>
   <p:sldIdLst>
     <p:sldId id="256" r:id="rId5"/>
@@ -17,13 +17,15 @@
     <p:sldId id="267" r:id="rId8"/>
     <p:sldId id="273" r:id="rId9"/>
     <p:sldId id="268" r:id="rId10"/>
-    <p:sldId id="270" r:id="rId11"/>
-    <p:sldId id="274" r:id="rId12"/>
+    <p:sldId id="274" r:id="rId11"/>
+    <p:sldId id="270" r:id="rId12"/>
     <p:sldId id="271" r:id="rId13"/>
     <p:sldId id="280" r:id="rId14"/>
     <p:sldId id="276" r:id="rId15"/>
     <p:sldId id="283" r:id="rId16"/>
-    <p:sldId id="281" r:id="rId17"/>
+    <p:sldId id="284" r:id="rId17"/>
+    <p:sldId id="285" r:id="rId18"/>
+    <p:sldId id="281" r:id="rId19"/>
   </p:sldIdLst>
   <p:sldSz cx="12192000" cy="6858000"/>
   <p:notesSz cx="6858000" cy="9144000"/>
@@ -227,7 +229,7 @@
           <a:p>
             <a:fld id="{2B85766F-5EC0-4797-B4D1-777FCB005B11}" type="datetimeFigureOut">
               <a:rPr lang="en-US" smtClean="0"/>
-              <a:t>11/29/2021</a:t>
+              <a:t>12/1/21</a:t>
             </a:fld>
             <a:endParaRPr lang="en-US" dirty="0"/>
           </a:p>
@@ -404,7 +406,7 @@
           <a:p>
             <a:fld id="{B2B4B5EC-152C-4627-80C0-63B10D5574EF}" type="datetimeFigureOut">
               <a:rPr lang="en-US" smtClean="0"/>
-              <a:t>11/29/2021</a:t>
+              <a:t>12/1/21</a:t>
             </a:fld>
             <a:endParaRPr lang="en-US" dirty="0"/>
           </a:p>
@@ -1010,7 +1012,7 @@
           <a:p>
             <a:fld id="{41EEE60E-651F-40CC-AD73-C00F10CE42B6}" type="slidenum">
               <a:rPr lang="en-US" smtClean="0"/>
-              <a:t>7</a:t>
+              <a:t>8</a:t>
             </a:fld>
             <a:endParaRPr lang="en-US" dirty="0"/>
           </a:p>
@@ -1108,6 +1110,342 @@
     <p:extLst>
       <p:ext uri="{BB962C8B-B14F-4D97-AF65-F5344CB8AC3E}">
         <p14:creationId xmlns:p14="http://schemas.microsoft.com/office/powerpoint/2010/main" val="592682646"/>
+      </p:ext>
+    </p:extLst>
+  </p:cSld>
+  <p:clrMapOvr>
+    <a:masterClrMapping/>
+  </p:clrMapOvr>
+</p:notes>
+</file>
+
+<file path=ppt/notesSlides/notesSlide6.xml><?xml version="1.0" encoding="utf-8"?>
+<p:notes xmlns:a="http://schemas.openxmlformats.org/drawingml/2006/main" xmlns:r="http://schemas.openxmlformats.org/officeDocument/2006/relationships" xmlns:p="http://schemas.openxmlformats.org/presentationml/2006/main">
+  <p:cSld>
+    <p:spTree>
+      <p:nvGrpSpPr>
+        <p:cNvPr id="1" name=""/>
+        <p:cNvGrpSpPr/>
+        <p:nvPr/>
+      </p:nvGrpSpPr>
+      <p:grpSpPr>
+        <a:xfrm>
+          <a:off x="0" y="0"/>
+          <a:ext cx="0" cy="0"/>
+          <a:chOff x="0" y="0"/>
+          <a:chExt cx="0" cy="0"/>
+        </a:xfrm>
+      </p:grpSpPr>
+      <p:sp>
+        <p:nvSpPr>
+          <p:cNvPr id="2" name="Slide Image Placeholder 1"/>
+          <p:cNvSpPr>
+            <a:spLocks noGrp="1" noRot="1" noChangeAspect="1"/>
+          </p:cNvSpPr>
+          <p:nvPr>
+            <p:ph type="sldImg"/>
+          </p:nvPr>
+        </p:nvSpPr>
+        <p:spPr/>
+      </p:sp>
+      <p:sp>
+        <p:nvSpPr>
+          <p:cNvPr id="3" name="Notes Placeholder 2"/>
+          <p:cNvSpPr>
+            <a:spLocks noGrp="1"/>
+          </p:cNvSpPr>
+          <p:nvPr>
+            <p:ph type="body" idx="1"/>
+          </p:nvPr>
+        </p:nvSpPr>
+        <p:spPr/>
+        <p:txBody>
+          <a:bodyPr/>
+          <a:lstStyle/>
+          <a:p>
+            <a:endParaRPr lang="en-US" dirty="0"/>
+          </a:p>
+        </p:txBody>
+      </p:sp>
+      <p:sp>
+        <p:nvSpPr>
+          <p:cNvPr id="4" name="Slide Number Placeholder 3"/>
+          <p:cNvSpPr>
+            <a:spLocks noGrp="1"/>
+          </p:cNvSpPr>
+          <p:nvPr>
+            <p:ph type="sldNum" sz="quarter" idx="5"/>
+          </p:nvPr>
+        </p:nvSpPr>
+        <p:spPr/>
+        <p:txBody>
+          <a:bodyPr/>
+          <a:lstStyle/>
+          <a:p>
+            <a:fld id="{41EEE60E-651F-40CC-AD73-C00F10CE42B6}" type="slidenum">
+              <a:rPr lang="en-US" smtClean="0"/>
+              <a:t>11</a:t>
+            </a:fld>
+            <a:endParaRPr lang="en-US" dirty="0"/>
+          </a:p>
+        </p:txBody>
+      </p:sp>
+    </p:spTree>
+    <p:extLst>
+      <p:ext uri="{BB962C8B-B14F-4D97-AF65-F5344CB8AC3E}">
+        <p14:creationId xmlns:p14="http://schemas.microsoft.com/office/powerpoint/2010/main" val="3173912996"/>
+      </p:ext>
+    </p:extLst>
+  </p:cSld>
+  <p:clrMapOvr>
+    <a:masterClrMapping/>
+  </p:clrMapOvr>
+</p:notes>
+</file>
+
+<file path=ppt/notesSlides/notesSlide7.xml><?xml version="1.0" encoding="utf-8"?>
+<p:notes xmlns:a="http://schemas.openxmlformats.org/drawingml/2006/main" xmlns:r="http://schemas.openxmlformats.org/officeDocument/2006/relationships" xmlns:p="http://schemas.openxmlformats.org/presentationml/2006/main">
+  <p:cSld>
+    <p:spTree>
+      <p:nvGrpSpPr>
+        <p:cNvPr id="1" name=""/>
+        <p:cNvGrpSpPr/>
+        <p:nvPr/>
+      </p:nvGrpSpPr>
+      <p:grpSpPr>
+        <a:xfrm>
+          <a:off x="0" y="0"/>
+          <a:ext cx="0" cy="0"/>
+          <a:chOff x="0" y="0"/>
+          <a:chExt cx="0" cy="0"/>
+        </a:xfrm>
+      </p:grpSpPr>
+      <p:sp>
+        <p:nvSpPr>
+          <p:cNvPr id="2" name="Slide Image Placeholder 1"/>
+          <p:cNvSpPr>
+            <a:spLocks noGrp="1" noRot="1" noChangeAspect="1"/>
+          </p:cNvSpPr>
+          <p:nvPr>
+            <p:ph type="sldImg"/>
+          </p:nvPr>
+        </p:nvSpPr>
+        <p:spPr/>
+      </p:sp>
+      <p:sp>
+        <p:nvSpPr>
+          <p:cNvPr id="3" name="Notes Placeholder 2"/>
+          <p:cNvSpPr>
+            <a:spLocks noGrp="1"/>
+          </p:cNvSpPr>
+          <p:nvPr>
+            <p:ph type="body" idx="1"/>
+          </p:nvPr>
+        </p:nvSpPr>
+        <p:spPr/>
+        <p:txBody>
+          <a:bodyPr/>
+          <a:lstStyle/>
+          <a:p>
+            <a:endParaRPr lang="en-US" dirty="0"/>
+          </a:p>
+        </p:txBody>
+      </p:sp>
+      <p:sp>
+        <p:nvSpPr>
+          <p:cNvPr id="4" name="Slide Number Placeholder 3"/>
+          <p:cNvSpPr>
+            <a:spLocks noGrp="1"/>
+          </p:cNvSpPr>
+          <p:nvPr>
+            <p:ph type="sldNum" sz="quarter" idx="5"/>
+          </p:nvPr>
+        </p:nvSpPr>
+        <p:spPr/>
+        <p:txBody>
+          <a:bodyPr/>
+          <a:lstStyle/>
+          <a:p>
+            <a:fld id="{41EEE60E-651F-40CC-AD73-C00F10CE42B6}" type="slidenum">
+              <a:rPr lang="en-US" smtClean="0"/>
+              <a:t>12</a:t>
+            </a:fld>
+            <a:endParaRPr lang="en-US" dirty="0"/>
+          </a:p>
+        </p:txBody>
+      </p:sp>
+    </p:spTree>
+    <p:extLst>
+      <p:ext uri="{BB962C8B-B14F-4D97-AF65-F5344CB8AC3E}">
+        <p14:creationId xmlns:p14="http://schemas.microsoft.com/office/powerpoint/2010/main" val="2219053722"/>
+      </p:ext>
+    </p:extLst>
+  </p:cSld>
+  <p:clrMapOvr>
+    <a:masterClrMapping/>
+  </p:clrMapOvr>
+</p:notes>
+</file>
+
+<file path=ppt/notesSlides/notesSlide8.xml><?xml version="1.0" encoding="utf-8"?>
+<p:notes xmlns:a="http://schemas.openxmlformats.org/drawingml/2006/main" xmlns:r="http://schemas.openxmlformats.org/officeDocument/2006/relationships" xmlns:p="http://schemas.openxmlformats.org/presentationml/2006/main">
+  <p:cSld>
+    <p:spTree>
+      <p:nvGrpSpPr>
+        <p:cNvPr id="1" name=""/>
+        <p:cNvGrpSpPr/>
+        <p:nvPr/>
+      </p:nvGrpSpPr>
+      <p:grpSpPr>
+        <a:xfrm>
+          <a:off x="0" y="0"/>
+          <a:ext cx="0" cy="0"/>
+          <a:chOff x="0" y="0"/>
+          <a:chExt cx="0" cy="0"/>
+        </a:xfrm>
+      </p:grpSpPr>
+      <p:sp>
+        <p:nvSpPr>
+          <p:cNvPr id="2" name="Slide Image Placeholder 1"/>
+          <p:cNvSpPr>
+            <a:spLocks noGrp="1" noRot="1" noChangeAspect="1"/>
+          </p:cNvSpPr>
+          <p:nvPr>
+            <p:ph type="sldImg"/>
+          </p:nvPr>
+        </p:nvSpPr>
+        <p:spPr/>
+      </p:sp>
+      <p:sp>
+        <p:nvSpPr>
+          <p:cNvPr id="3" name="Notes Placeholder 2"/>
+          <p:cNvSpPr>
+            <a:spLocks noGrp="1"/>
+          </p:cNvSpPr>
+          <p:nvPr>
+            <p:ph type="body" idx="1"/>
+          </p:nvPr>
+        </p:nvSpPr>
+        <p:spPr/>
+        <p:txBody>
+          <a:bodyPr/>
+          <a:lstStyle/>
+          <a:p>
+            <a:endParaRPr lang="en-US" dirty="0"/>
+          </a:p>
+        </p:txBody>
+      </p:sp>
+      <p:sp>
+        <p:nvSpPr>
+          <p:cNvPr id="4" name="Slide Number Placeholder 3"/>
+          <p:cNvSpPr>
+            <a:spLocks noGrp="1"/>
+          </p:cNvSpPr>
+          <p:nvPr>
+            <p:ph type="sldNum" sz="quarter" idx="5"/>
+          </p:nvPr>
+        </p:nvSpPr>
+        <p:spPr/>
+        <p:txBody>
+          <a:bodyPr/>
+          <a:lstStyle/>
+          <a:p>
+            <a:fld id="{41EEE60E-651F-40CC-AD73-C00F10CE42B6}" type="slidenum">
+              <a:rPr lang="en-US" smtClean="0"/>
+              <a:t>13</a:t>
+            </a:fld>
+            <a:endParaRPr lang="en-US" dirty="0"/>
+          </a:p>
+        </p:txBody>
+      </p:sp>
+    </p:spTree>
+    <p:extLst>
+      <p:ext uri="{BB962C8B-B14F-4D97-AF65-F5344CB8AC3E}">
+        <p14:creationId xmlns:p14="http://schemas.microsoft.com/office/powerpoint/2010/main" val="2774429904"/>
+      </p:ext>
+    </p:extLst>
+  </p:cSld>
+  <p:clrMapOvr>
+    <a:masterClrMapping/>
+  </p:clrMapOvr>
+</p:notes>
+</file>
+
+<file path=ppt/notesSlides/notesSlide9.xml><?xml version="1.0" encoding="utf-8"?>
+<p:notes xmlns:a="http://schemas.openxmlformats.org/drawingml/2006/main" xmlns:r="http://schemas.openxmlformats.org/officeDocument/2006/relationships" xmlns:p="http://schemas.openxmlformats.org/presentationml/2006/main">
+  <p:cSld>
+    <p:spTree>
+      <p:nvGrpSpPr>
+        <p:cNvPr id="1" name=""/>
+        <p:cNvGrpSpPr/>
+        <p:nvPr/>
+      </p:nvGrpSpPr>
+      <p:grpSpPr>
+        <a:xfrm>
+          <a:off x="0" y="0"/>
+          <a:ext cx="0" cy="0"/>
+          <a:chOff x="0" y="0"/>
+          <a:chExt cx="0" cy="0"/>
+        </a:xfrm>
+      </p:grpSpPr>
+      <p:sp>
+        <p:nvSpPr>
+          <p:cNvPr id="2" name="Slide Image Placeholder 1"/>
+          <p:cNvSpPr>
+            <a:spLocks noGrp="1" noRot="1" noChangeAspect="1"/>
+          </p:cNvSpPr>
+          <p:nvPr>
+            <p:ph type="sldImg"/>
+          </p:nvPr>
+        </p:nvSpPr>
+        <p:spPr/>
+      </p:sp>
+      <p:sp>
+        <p:nvSpPr>
+          <p:cNvPr id="3" name="Notes Placeholder 2"/>
+          <p:cNvSpPr>
+            <a:spLocks noGrp="1"/>
+          </p:cNvSpPr>
+          <p:nvPr>
+            <p:ph type="body" idx="1"/>
+          </p:nvPr>
+        </p:nvSpPr>
+        <p:spPr/>
+        <p:txBody>
+          <a:bodyPr/>
+          <a:lstStyle/>
+          <a:p>
+            <a:endParaRPr lang="en-US" dirty="0"/>
+          </a:p>
+        </p:txBody>
+      </p:sp>
+      <p:sp>
+        <p:nvSpPr>
+          <p:cNvPr id="4" name="Slide Number Placeholder 3"/>
+          <p:cNvSpPr>
+            <a:spLocks noGrp="1"/>
+          </p:cNvSpPr>
+          <p:nvPr>
+            <p:ph type="sldNum" sz="quarter" idx="5"/>
+          </p:nvPr>
+        </p:nvSpPr>
+        <p:spPr/>
+        <p:txBody>
+          <a:bodyPr/>
+          <a:lstStyle/>
+          <a:p>
+            <a:fld id="{41EEE60E-651F-40CC-AD73-C00F10CE42B6}" type="slidenum">
+              <a:rPr lang="en-US" smtClean="0"/>
+              <a:t>14</a:t>
+            </a:fld>
+            <a:endParaRPr lang="en-US" dirty="0"/>
+          </a:p>
+        </p:txBody>
+      </p:sp>
+    </p:spTree>
+    <p:extLst>
+      <p:ext uri="{BB962C8B-B14F-4D97-AF65-F5344CB8AC3E}">
+        <p14:creationId xmlns:p14="http://schemas.microsoft.com/office/powerpoint/2010/main" val="639246613"/>
       </p:ext>
     </p:extLst>
   </p:cSld>
@@ -1343,7 +1681,7 @@
           <a:p>
             <a:fld id="{A50102C3-0ACF-4586-9299-BA5FBA387EC9}" type="datetime1">
               <a:rPr lang="en-US" smtClean="0"/>
-              <a:t>11/29/2021</a:t>
+              <a:t>12/1/21</a:t>
             </a:fld>
             <a:endParaRPr lang="en-US" dirty="0"/>
           </a:p>
@@ -1551,7 +1889,7 @@
           <a:p>
             <a:fld id="{80A576E7-32ED-4142-88BA-631DE7068928}" type="datetime1">
               <a:rPr lang="en-US" smtClean="0"/>
-              <a:t>11/29/2021</a:t>
+              <a:t>12/1/21</a:t>
             </a:fld>
             <a:endParaRPr lang="en-US" dirty="0"/>
           </a:p>
@@ -1807,7 +2145,7 @@
           <a:p>
             <a:fld id="{A8DD9661-E819-4932-ABFA-3312F6AF4890}" type="datetime1">
               <a:rPr lang="en-US" smtClean="0"/>
-              <a:t>11/29/2021</a:t>
+              <a:t>12/1/21</a:t>
             </a:fld>
             <a:endParaRPr lang="en-US" dirty="0"/>
           </a:p>
@@ -1977,7 +2315,7 @@
           <a:p>
             <a:fld id="{14148A5B-55A6-4E38-AFD2-29681AB29EE5}" type="datetime1">
               <a:rPr lang="en-US" smtClean="0"/>
-              <a:t>11/29/2021</a:t>
+              <a:t>12/1/21</a:t>
             </a:fld>
             <a:endParaRPr lang="en-US" dirty="0"/>
           </a:p>
@@ -2320,7 +2658,7 @@
           <a:p>
             <a:fld id="{C019DC11-ACC8-4100-B6D6-5F9F62746E55}" type="datetime1">
               <a:rPr lang="en-US" smtClean="0"/>
-              <a:t>11/29/2021</a:t>
+              <a:t>12/1/21</a:t>
             </a:fld>
             <a:endParaRPr lang="en-US" dirty="0"/>
           </a:p>
@@ -2595,7 +2933,7 @@
           <a:p>
             <a:fld id="{99BFBEAF-6413-4AE7-B8C9-569CDFB8FD46}" type="datetime1">
               <a:rPr lang="en-US" smtClean="0"/>
-              <a:t>11/29/2021</a:t>
+              <a:t>12/1/21</a:t>
             </a:fld>
             <a:endParaRPr lang="en-US" dirty="0"/>
           </a:p>
@@ -2974,7 +3312,7 @@
           <a:p>
             <a:fld id="{7B90014E-65EC-4EF5-B73A-FD7809D22A25}" type="datetime1">
               <a:rPr lang="en-US" smtClean="0"/>
-              <a:t>11/29/2021</a:t>
+              <a:t>12/1/21</a:t>
             </a:fld>
             <a:endParaRPr lang="en-US" dirty="0"/>
           </a:p>
@@ -3092,7 +3430,7 @@
           <a:p>
             <a:fld id="{A55B23F2-A3CB-430D-AAC5-8BC1CAB0DA7A}" type="datetime1">
               <a:rPr lang="en-US" smtClean="0"/>
-              <a:t>11/29/2021</a:t>
+              <a:t>12/1/21</a:t>
             </a:fld>
             <a:endParaRPr lang="en-US" dirty="0"/>
           </a:p>
@@ -3263,7 +3601,7 @@
           <a:p>
             <a:fld id="{1214FEC0-82C6-4B0F-B01C-B63D85CDDE08}" type="datetime1">
               <a:rPr lang="en-US" smtClean="0"/>
-              <a:t>11/29/2021</a:t>
+              <a:t>12/1/21</a:t>
             </a:fld>
             <a:endParaRPr lang="en-US" dirty="0"/>
           </a:p>
@@ -3617,7 +3955,7 @@
           <a:p>
             <a:fld id="{1773A730-02BF-452E-81D2-2F14F984DD4E}" type="datetime1">
               <a:rPr lang="en-US" smtClean="0"/>
-              <a:t>11/29/2021</a:t>
+              <a:t>12/1/21</a:t>
             </a:fld>
             <a:endParaRPr lang="en-US" dirty="0"/>
           </a:p>
@@ -3994,7 +4332,7 @@
           <a:p>
             <a:fld id="{F53C5C61-C01F-4240-A551-6D31467AA6E3}" type="datetime1">
               <a:rPr lang="en-US" smtClean="0"/>
-              <a:t>11/29/2021</a:t>
+              <a:t>12/1/21</a:t>
             </a:fld>
             <a:endParaRPr lang="en-US" dirty="0"/>
           </a:p>
@@ -4281,7 +4619,7 @@
           <a:p>
             <a:fld id="{0043DE8B-5129-4421-A1ED-E86461DFA921}" type="datetime1">
               <a:rPr lang="en-US" smtClean="0"/>
-              <a:t>11/29/2021</a:t>
+              <a:t>12/1/21</a:t>
             </a:fld>
             <a:endParaRPr lang="en-US" dirty="0"/>
           </a:p>
@@ -5381,253 +5719,17 @@
           <a:lstStyle/>
           <a:p>
             <a:r>
+              <a:rPr lang="en-US" dirty="0"/>
+              <a:t>Optimizing </a:t>
+            </a:r>
+            <a:r>
               <a:rPr lang="en-US" dirty="0" err="1"/>
               <a:t>AaronNet</a:t>
             </a:r>
-            <a:r>
-              <a:rPr lang="en-US" dirty="0"/>
-              <a:t> Variations</a:t>
-            </a:r>
-          </a:p>
-        </p:txBody>
-      </p:sp>
-      <p:sp>
-        <p:nvSpPr>
-          <p:cNvPr id="7" name="TextBox 6">
-            <a:extLst>
-              <a:ext uri="{FF2B5EF4-FFF2-40B4-BE49-F238E27FC236}">
-                <a16:creationId xmlns:a16="http://schemas.microsoft.com/office/drawing/2014/main" id="{3FB79DC2-36E3-4B18-B3F4-FFAA2F24C130}"/>
-              </a:ext>
-            </a:extLst>
-          </p:cNvPr>
-          <p:cNvSpPr txBox="1"/>
-          <p:nvPr/>
-        </p:nvSpPr>
-        <p:spPr>
-          <a:xfrm>
-            <a:off x="1097279" y="1919287"/>
-            <a:ext cx="10058399" cy="3970318"/>
-          </a:xfrm>
-          <a:prstGeom prst="rect">
-            <a:avLst/>
-          </a:prstGeom>
-          <a:noFill/>
-        </p:spPr>
-        <p:txBody>
-          <a:bodyPr wrap="square" rtlCol="0">
-            <a:spAutoFit/>
-          </a:bodyPr>
-          <a:lstStyle/>
-          <a:p>
-            <a:pPr marL="285750" indent="-285750">
-              <a:buFont typeface="Wingdings" panose="05000000000000000000" pitchFamily="2" charset="2"/>
-              <a:buChar char="Ø"/>
-            </a:pPr>
-            <a:r>
-              <a:rPr lang="en-CA" dirty="0"/>
-              <a:t>Compressing </a:t>
-            </a:r>
-            <a:r>
-              <a:rPr lang="en-CA" dirty="0" err="1"/>
-              <a:t>AaronNet</a:t>
-            </a:r>
-            <a:r>
-              <a:rPr lang="en-CA" dirty="0"/>
-              <a:t> -&gt; </a:t>
-            </a:r>
-            <a:r>
-              <a:rPr lang="en-CA" dirty="0" err="1"/>
-              <a:t>AaronNet</a:t>
-            </a:r>
-            <a:r>
-              <a:rPr lang="en-CA" dirty="0"/>
-              <a:t>-Small</a:t>
-            </a:r>
-          </a:p>
-          <a:p>
-            <a:pPr marL="285750" indent="-285750">
-              <a:buFont typeface="Wingdings" panose="05000000000000000000" pitchFamily="2" charset="2"/>
-              <a:buChar char="Ø"/>
-            </a:pPr>
-            <a:endParaRPr lang="en-CA" dirty="0"/>
-          </a:p>
-          <a:p>
-            <a:pPr marL="285750" indent="-285750">
-              <a:buFont typeface="Wingdings" panose="05000000000000000000" pitchFamily="2" charset="2"/>
-              <a:buChar char="Ø"/>
-            </a:pPr>
-            <a:r>
-              <a:rPr lang="en-CA" dirty="0"/>
-              <a:t>S</a:t>
-            </a:r>
-            <a:r>
-              <a:rPr lang="en-US" dirty="0" err="1"/>
-              <a:t>ignificant</a:t>
-            </a:r>
-            <a:r>
-              <a:rPr lang="en-US" dirty="0"/>
-              <a:t> results using the following methods:</a:t>
-            </a:r>
-          </a:p>
-          <a:p>
-            <a:pPr marL="742950" lvl="1" indent="-285750">
-              <a:buFont typeface="Wingdings" panose="05000000000000000000" pitchFamily="2" charset="2"/>
-              <a:buChar char="Ø"/>
-            </a:pPr>
-            <a:r>
-              <a:rPr lang="en-US" dirty="0"/>
-              <a:t>Knowledge distillation</a:t>
-            </a:r>
-          </a:p>
-          <a:p>
-            <a:pPr marL="742950" lvl="1" indent="-285750">
-              <a:buFont typeface="Wingdings" panose="05000000000000000000" pitchFamily="2" charset="2"/>
-              <a:buChar char="Ø"/>
-            </a:pPr>
-            <a:r>
-              <a:rPr lang="en-US" dirty="0"/>
-              <a:t>Layer-wise quantization</a:t>
-            </a:r>
-          </a:p>
-          <a:p>
-            <a:pPr marL="742950" lvl="1" indent="-285750">
-              <a:buFont typeface="Wingdings" panose="05000000000000000000" pitchFamily="2" charset="2"/>
-              <a:buChar char="Ø"/>
-            </a:pPr>
-            <a:r>
-              <a:rPr lang="en-US" dirty="0"/>
-              <a:t>Layer-wise pruning</a:t>
-            </a:r>
-          </a:p>
-          <a:p>
-            <a:pPr marL="742950" lvl="1" indent="-285750">
-              <a:buFont typeface="Wingdings" panose="05000000000000000000" pitchFamily="2" charset="2"/>
-              <a:buChar char="Ø"/>
-            </a:pPr>
-            <a:r>
-              <a:rPr lang="en-US" dirty="0"/>
-              <a:t>Using Self-attention mechanism SE block</a:t>
-            </a:r>
-          </a:p>
-          <a:p>
-            <a:pPr marL="742950" lvl="1" indent="-285750">
-              <a:buFont typeface="Wingdings" panose="05000000000000000000" pitchFamily="2" charset="2"/>
-              <a:buChar char="Ø"/>
-            </a:pPr>
-            <a:r>
-              <a:rPr lang="en-US" dirty="0"/>
-              <a:t>Unstructured pruning (More energy efficiency)</a:t>
-            </a:r>
-          </a:p>
-          <a:p>
-            <a:pPr marL="742950" lvl="1" indent="-285750">
-              <a:buFont typeface="Wingdings" panose="05000000000000000000" pitchFamily="2" charset="2"/>
-              <a:buChar char="Ø"/>
-            </a:pPr>
-            <a:r>
-              <a:rPr lang="en-US" dirty="0"/>
-              <a:t>Structured pruning (More hardware friendly)</a:t>
-            </a:r>
-          </a:p>
-          <a:p>
-            <a:pPr lvl="1"/>
-            <a:endParaRPr lang="en-US" dirty="0"/>
-          </a:p>
-          <a:p>
-            <a:pPr marL="285750" indent="-285750">
-              <a:buFont typeface="Wingdings" panose="05000000000000000000" pitchFamily="2" charset="2"/>
-              <a:buChar char="Ø"/>
-            </a:pPr>
-            <a:r>
-              <a:rPr lang="en-US" dirty="0"/>
-              <a:t>The best results we had so far: </a:t>
-            </a:r>
-            <a:r>
-              <a:rPr lang="en-US" b="1" dirty="0">
-                <a:solidFill>
-                  <a:srgbClr val="FF0000"/>
-                </a:solidFill>
-              </a:rPr>
-              <a:t>Unstructured Pruning</a:t>
-            </a:r>
-          </a:p>
-          <a:p>
-            <a:pPr marL="285750" indent="-285750">
-              <a:buFont typeface="Wingdings" panose="05000000000000000000" pitchFamily="2" charset="2"/>
-              <a:buChar char="Ø"/>
-            </a:pPr>
-            <a:endParaRPr lang="en-US" dirty="0">
-              <a:solidFill>
-                <a:srgbClr val="FF0000"/>
-              </a:solidFill>
-            </a:endParaRPr>
-          </a:p>
-          <a:p>
-            <a:pPr marL="285750" indent="-285750">
-              <a:buFont typeface="Wingdings" panose="05000000000000000000" pitchFamily="2" charset="2"/>
-              <a:buChar char="Ø"/>
-            </a:pPr>
-            <a:r>
-              <a:rPr lang="en-US" dirty="0"/>
-              <a:t>Finalizing our paper for submission</a:t>
-            </a:r>
-          </a:p>
-          <a:p>
-            <a:endParaRPr lang="en-US" b="1" dirty="0">
-              <a:solidFill>
-                <a:srgbClr val="FF0000"/>
-              </a:solidFill>
-            </a:endParaRPr>
-          </a:p>
-        </p:txBody>
-      </p:sp>
-      <p:pic>
-        <p:nvPicPr>
-          <p:cNvPr id="2050" name="Picture 2" descr="Don&amp;#39;t Compress Yourself (improving your posture by doing less) - Lauren  Hill&amp;#39;s Alexander Teaching Studio">
-            <a:extLst>
-              <a:ext uri="{FF2B5EF4-FFF2-40B4-BE49-F238E27FC236}">
-                <a16:creationId xmlns:a16="http://schemas.microsoft.com/office/drawing/2014/main" id="{769C4D6D-9558-473D-838D-1E1067C3FDEB}"/>
-              </a:ext>
-            </a:extLst>
-          </p:cNvPr>
-          <p:cNvPicPr>
-            <a:picLocks noChangeAspect="1" noChangeArrowheads="1"/>
-          </p:cNvPicPr>
-          <p:nvPr/>
-        </p:nvPicPr>
-        <p:blipFill>
-          <a:blip r:embed="rId3">
-            <a:extLst>
-              <a:ext uri="{28A0092B-C50C-407E-A947-70E740481C1C}">
-                <a14:useLocalDpi xmlns:a14="http://schemas.microsoft.com/office/drawing/2010/main" val="0"/>
-              </a:ext>
-            </a:extLst>
-          </a:blip>
-          <a:srcRect/>
-          <a:stretch>
-            <a:fillRect/>
-          </a:stretch>
-        </p:blipFill>
-        <p:spPr bwMode="auto">
-          <a:xfrm>
-            <a:off x="6785393" y="2236116"/>
-            <a:ext cx="4370285" cy="1720800"/>
-          </a:xfrm>
-          <a:prstGeom prst="rect">
-            <a:avLst/>
-          </a:prstGeom>
-          <a:noFill/>
-          <a:extLst>
-            <a:ext uri="{909E8E84-426E-40DD-AFC4-6F175D3DCCD1}">
-              <a14:hiddenFill xmlns:a14="http://schemas.microsoft.com/office/drawing/2010/main">
-                <a:solidFill>
-                  <a:srgbClr val="FFFFFF"/>
-                </a:solidFill>
-              </a14:hiddenFill>
-            </a:ext>
-          </a:extLst>
-        </p:spPr>
-      </p:pic>
+            <a:endParaRPr lang="en-US" dirty="0"/>
+          </a:p>
+        </p:txBody>
+      </p:sp>
       <p:sp>
         <p:nvSpPr>
           <p:cNvPr id="9" name="Slide Number Placeholder 8">
@@ -5657,6 +5759,227 @@
           </a:p>
         </p:txBody>
       </p:sp>
+      <p:sp>
+        <p:nvSpPr>
+          <p:cNvPr id="6" name="Content Placeholder 2">
+            <a:extLst>
+              <a:ext uri="{FF2B5EF4-FFF2-40B4-BE49-F238E27FC236}">
+                <a16:creationId xmlns:a16="http://schemas.microsoft.com/office/drawing/2014/main" id="{83A3D870-C911-B74D-99ED-43A60A9AB993}"/>
+              </a:ext>
+            </a:extLst>
+          </p:cNvPr>
+          <p:cNvSpPr>
+            <a:spLocks noGrp="1"/>
+          </p:cNvSpPr>
+          <p:nvPr>
+            <p:ph idx="1"/>
+          </p:nvPr>
+        </p:nvSpPr>
+        <p:spPr>
+          <a:xfrm>
+            <a:off x="498070" y="2145562"/>
+            <a:ext cx="10058400" cy="4023360"/>
+          </a:xfrm>
+        </p:spPr>
+        <p:txBody>
+          <a:bodyPr>
+            <a:normAutofit/>
+          </a:bodyPr>
+          <a:lstStyle/>
+          <a:p>
+            <a:pPr>
+              <a:buFont typeface="Wingdings" pitchFamily="2" charset="2"/>
+              <a:buChar char="§"/>
+            </a:pPr>
+            <a:r>
+              <a:rPr lang="en-CA" dirty="0"/>
+              <a:t>S</a:t>
+            </a:r>
+            <a:r>
+              <a:rPr lang="en-US" dirty="0" err="1"/>
+              <a:t>ignificant</a:t>
+            </a:r>
+            <a:r>
+              <a:rPr lang="en-US" dirty="0"/>
+              <a:t> results using the following methods:</a:t>
+            </a:r>
+          </a:p>
+          <a:p>
+            <a:pPr marL="742950" lvl="1" indent="-285750">
+              <a:buFont typeface="Wingdings" pitchFamily="2" charset="2"/>
+              <a:buChar char="§"/>
+            </a:pPr>
+            <a:r>
+              <a:rPr lang="en-US" dirty="0"/>
+              <a:t>Layer-wise quantization and pruning</a:t>
+            </a:r>
+          </a:p>
+          <a:p>
+            <a:pPr marL="742950" lvl="1" indent="-285750">
+              <a:buFont typeface="Wingdings" pitchFamily="2" charset="2"/>
+              <a:buChar char="§"/>
+            </a:pPr>
+            <a:r>
+              <a:rPr lang="en-US" dirty="0"/>
+              <a:t>Using Self-attention mechanism SE block</a:t>
+            </a:r>
+          </a:p>
+          <a:p>
+            <a:pPr marL="742950" lvl="1" indent="-285750">
+              <a:buFont typeface="Wingdings" pitchFamily="2" charset="2"/>
+              <a:buChar char="§"/>
+            </a:pPr>
+            <a:r>
+              <a:rPr lang="en-US" dirty="0"/>
+              <a:t>Unstructured pruning (More energy efficiency)</a:t>
+            </a:r>
+          </a:p>
+          <a:p>
+            <a:pPr marL="742950" lvl="1" indent="-285750">
+              <a:buFont typeface="Wingdings" pitchFamily="2" charset="2"/>
+              <a:buChar char="§"/>
+            </a:pPr>
+            <a:r>
+              <a:rPr lang="en-US" dirty="0"/>
+              <a:t>Structured pruning (More hardware friendly)</a:t>
+            </a:r>
+          </a:p>
+          <a:p>
+            <a:pPr lvl="1">
+              <a:buFont typeface="Wingdings" pitchFamily="2" charset="2"/>
+              <a:buChar char="§"/>
+            </a:pPr>
+            <a:endParaRPr lang="en-US" dirty="0"/>
+          </a:p>
+          <a:p>
+            <a:pPr>
+              <a:buFont typeface="Wingdings" pitchFamily="2" charset="2"/>
+              <a:buChar char="§"/>
+            </a:pPr>
+            <a:r>
+              <a:rPr lang="en-US" dirty="0"/>
+              <a:t>The best results we had so far: </a:t>
+            </a:r>
+            <a:r>
+              <a:rPr lang="en-US" b="1" dirty="0">
+                <a:solidFill>
+                  <a:schemeClr val="tx1"/>
+                </a:solidFill>
+              </a:rPr>
+              <a:t>Unstructured Pruning</a:t>
+            </a:r>
+          </a:p>
+          <a:p>
+            <a:pPr lvl="1">
+              <a:buFont typeface="Wingdings" pitchFamily="2" charset="2"/>
+              <a:buChar char="§"/>
+            </a:pPr>
+            <a:r>
+              <a:rPr lang="en-CA" b="1" dirty="0" err="1"/>
+              <a:t>AaronNet</a:t>
+            </a:r>
+            <a:r>
+              <a:rPr lang="en-CA" b="1" dirty="0"/>
+              <a:t>+ </a:t>
+            </a:r>
+            <a:r>
+              <a:rPr lang="en-CA" dirty="0">
+                <a:sym typeface="Wingdings" pitchFamily="2" charset="2"/>
+              </a:rPr>
+              <a:t></a:t>
+            </a:r>
+            <a:r>
+              <a:rPr lang="en-CA" dirty="0"/>
+              <a:t> Slightly pruned </a:t>
+            </a:r>
+            <a:r>
+              <a:rPr lang="en-CA" dirty="0" err="1"/>
+              <a:t>AaronNet</a:t>
+            </a:r>
+            <a:endParaRPr lang="en-CA" dirty="0"/>
+          </a:p>
+          <a:p>
+            <a:pPr lvl="1">
+              <a:buFont typeface="Wingdings" pitchFamily="2" charset="2"/>
+              <a:buChar char="§"/>
+            </a:pPr>
+            <a:r>
+              <a:rPr lang="en-CA" b="1" dirty="0" err="1"/>
+              <a:t>AaronNet</a:t>
+            </a:r>
+            <a:r>
+              <a:rPr lang="en-CA" b="1" dirty="0"/>
+              <a:t>++ </a:t>
+            </a:r>
+            <a:r>
+              <a:rPr lang="en-CA" dirty="0">
+                <a:sym typeface="Wingdings" pitchFamily="2" charset="2"/>
+              </a:rPr>
+              <a:t> </a:t>
+            </a:r>
+            <a:r>
+              <a:rPr lang="en-CA" dirty="0"/>
+              <a:t>Highly pruned </a:t>
+            </a:r>
+            <a:r>
+              <a:rPr lang="en-CA" dirty="0" err="1"/>
+              <a:t>AaronNet</a:t>
+            </a:r>
+            <a:endParaRPr lang="en-CA" dirty="0"/>
+          </a:p>
+          <a:p>
+            <a:pPr>
+              <a:buFont typeface="Wingdings" pitchFamily="2" charset="2"/>
+              <a:buChar char="§"/>
+            </a:pPr>
+            <a:endParaRPr lang="en-US" dirty="0">
+              <a:solidFill>
+                <a:srgbClr val="FF0000"/>
+              </a:solidFill>
+            </a:endParaRPr>
+          </a:p>
+          <a:p>
+            <a:pPr>
+              <a:buFont typeface="Wingdings" pitchFamily="2" charset="2"/>
+              <a:buChar char="§"/>
+            </a:pPr>
+            <a:r>
+              <a:rPr lang="en-US" dirty="0"/>
+              <a:t>Finalizing our paper for submission</a:t>
+            </a:r>
+          </a:p>
+        </p:txBody>
+      </p:sp>
+      <p:pic>
+        <p:nvPicPr>
+          <p:cNvPr id="5" name="Picture 4">
+            <a:extLst>
+              <a:ext uri="{FF2B5EF4-FFF2-40B4-BE49-F238E27FC236}">
+                <a16:creationId xmlns:a16="http://schemas.microsoft.com/office/drawing/2014/main" id="{4D285EBF-AB88-4F47-A273-73AB7C2A22FC}"/>
+              </a:ext>
+            </a:extLst>
+          </p:cNvPr>
+          <p:cNvPicPr>
+            <a:picLocks noChangeAspect="1"/>
+          </p:cNvPicPr>
+          <p:nvPr/>
+        </p:nvPicPr>
+        <p:blipFill>
+          <a:blip r:embed="rId3"/>
+          <a:stretch>
+            <a:fillRect/>
+          </a:stretch>
+        </p:blipFill>
+        <p:spPr>
+          <a:xfrm>
+            <a:off x="8375515" y="1854699"/>
+            <a:ext cx="2548647" cy="4209819"/>
+          </a:xfrm>
+          <a:prstGeom prst="rect">
+            <a:avLst/>
+          </a:prstGeom>
+        </p:spPr>
+      </p:pic>
     </p:spTree>
     <p:extLst>
       <p:ext uri="{BB962C8B-B14F-4D97-AF65-F5344CB8AC3E}">
@@ -5715,186 +6038,6 @@
           </a:p>
         </p:txBody>
       </p:sp>
-      <p:sp>
-        <p:nvSpPr>
-          <p:cNvPr id="12" name="TextBox 11">
-            <a:extLst>
-              <a:ext uri="{FF2B5EF4-FFF2-40B4-BE49-F238E27FC236}">
-                <a16:creationId xmlns:a16="http://schemas.microsoft.com/office/drawing/2014/main" id="{0BE304BD-EEB3-43C2-9502-7376B51F3CAC}"/>
-              </a:ext>
-            </a:extLst>
-          </p:cNvPr>
-          <p:cNvSpPr txBox="1"/>
-          <p:nvPr/>
-        </p:nvSpPr>
-        <p:spPr>
-          <a:xfrm>
-            <a:off x="387849" y="2342507"/>
-            <a:ext cx="6097712" cy="2862322"/>
-          </a:xfrm>
-          <a:prstGeom prst="rect">
-            <a:avLst/>
-          </a:prstGeom>
-          <a:noFill/>
-        </p:spPr>
-        <p:txBody>
-          <a:bodyPr wrap="square">
-            <a:spAutoFit/>
-          </a:bodyPr>
-          <a:lstStyle/>
-          <a:p>
-            <a:pPr>
-              <a:buFont typeface="Wingdings" panose="05000000000000000000" pitchFamily="2" charset="2"/>
-              <a:buChar char="Ø"/>
-            </a:pPr>
-            <a:r>
-              <a:rPr lang="en-US" dirty="0"/>
-              <a:t>Baseline for inference cost: VGG network</a:t>
-            </a:r>
-          </a:p>
-          <a:p>
-            <a:pPr lvl="1">
-              <a:buFont typeface="Wingdings" panose="05000000000000000000" pitchFamily="2" charset="2"/>
-              <a:buChar char="Ø"/>
-            </a:pPr>
-            <a:r>
-              <a:rPr lang="en-US" dirty="0"/>
-              <a:t> Inference cost = </a:t>
-            </a:r>
-            <a:r>
-              <a:rPr lang="en-US" b="1" dirty="0">
-                <a:solidFill>
-                  <a:srgbClr val="FF0000"/>
-                </a:solidFill>
-              </a:rPr>
-              <a:t>1</a:t>
-            </a:r>
-          </a:p>
-          <a:p>
-            <a:pPr lvl="1">
-              <a:buFont typeface="Wingdings" panose="05000000000000000000" pitchFamily="2" charset="2"/>
-              <a:buChar char="Ø"/>
-            </a:pPr>
-            <a:r>
-              <a:rPr lang="en-US" dirty="0"/>
-              <a:t> Accuracy = </a:t>
-            </a:r>
-            <a:r>
-              <a:rPr lang="en-US" b="1" dirty="0">
-                <a:solidFill>
-                  <a:srgbClr val="FF0000"/>
-                </a:solidFill>
-              </a:rPr>
-              <a:t>59.46%</a:t>
-            </a:r>
-          </a:p>
-          <a:p>
-            <a:pPr>
-              <a:buFont typeface="Wingdings" panose="05000000000000000000" pitchFamily="2" charset="2"/>
-              <a:buChar char="Ø"/>
-            </a:pPr>
-            <a:endParaRPr lang="en-US" dirty="0"/>
-          </a:p>
-          <a:p>
-            <a:pPr>
-              <a:buFont typeface="Wingdings" panose="05000000000000000000" pitchFamily="2" charset="2"/>
-              <a:buChar char="Ø"/>
-            </a:pPr>
-            <a:endParaRPr lang="en-US" dirty="0"/>
-          </a:p>
-          <a:p>
-            <a:pPr>
-              <a:buFont typeface="Wingdings" panose="05000000000000000000" pitchFamily="2" charset="2"/>
-              <a:buChar char="Ø"/>
-            </a:pPr>
-            <a:endParaRPr lang="en-US" dirty="0"/>
-          </a:p>
-          <a:p>
-            <a:pPr>
-              <a:buFont typeface="Wingdings" panose="05000000000000000000" pitchFamily="2" charset="2"/>
-              <a:buChar char="Ø"/>
-            </a:pPr>
-            <a:r>
-              <a:rPr lang="en-US" dirty="0"/>
-              <a:t>Unstructured Pruning of </a:t>
-            </a:r>
-            <a:r>
-              <a:rPr lang="en-US" dirty="0" err="1"/>
-              <a:t>MobileNet</a:t>
-            </a:r>
-            <a:r>
-              <a:rPr lang="en-US" dirty="0"/>
-              <a:t> (initial round)</a:t>
-            </a:r>
-          </a:p>
-          <a:p>
-            <a:pPr lvl="1">
-              <a:buFont typeface="Wingdings" panose="05000000000000000000" pitchFamily="2" charset="2"/>
-              <a:buChar char="Ø"/>
-            </a:pPr>
-            <a:r>
-              <a:rPr lang="en-US" dirty="0"/>
-              <a:t> Using </a:t>
-            </a:r>
-            <a:r>
-              <a:rPr lang="en-US" b="1" dirty="0"/>
-              <a:t>P100 GPU </a:t>
-            </a:r>
-            <a:r>
-              <a:rPr lang="en-US" dirty="0"/>
-              <a:t>on Kaggle</a:t>
-            </a:r>
-          </a:p>
-          <a:p>
-            <a:pPr lvl="1">
-              <a:buFont typeface="Wingdings" panose="05000000000000000000" pitchFamily="2" charset="2"/>
-              <a:buChar char="Ø"/>
-            </a:pPr>
-            <a:r>
-              <a:rPr lang="en-US" dirty="0"/>
-              <a:t> Accuracy = </a:t>
-            </a:r>
-            <a:r>
-              <a:rPr lang="en-US" b="1" dirty="0">
-                <a:solidFill>
-                  <a:srgbClr val="FF0000"/>
-                </a:solidFill>
-              </a:rPr>
-              <a:t>56.15%</a:t>
-            </a:r>
-          </a:p>
-          <a:p>
-            <a:pPr lvl="1">
-              <a:buFont typeface="Wingdings" panose="05000000000000000000" pitchFamily="2" charset="2"/>
-              <a:buChar char="Ø"/>
-            </a:pPr>
-            <a:r>
-              <a:rPr lang="en-US" dirty="0"/>
-              <a:t> </a:t>
-            </a:r>
-            <a:r>
-              <a:rPr lang="en-US" b="1" dirty="0">
-                <a:solidFill>
-                  <a:srgbClr val="FF0000"/>
-                </a:solidFill>
-              </a:rPr>
-              <a:t>21x</a:t>
-            </a:r>
-            <a:r>
-              <a:rPr lang="en-US" dirty="0"/>
-              <a:t> inference cost (</a:t>
-            </a:r>
-            <a:r>
-              <a:rPr lang="en-US" b="1" dirty="0"/>
-              <a:t>0.046</a:t>
-            </a:r>
-            <a:r>
-              <a:rPr lang="en-US" dirty="0"/>
-              <a:t>)</a:t>
-            </a:r>
-          </a:p>
-        </p:txBody>
-      </p:sp>
       <p:pic>
         <p:nvPicPr>
           <p:cNvPr id="5122" name="Picture 2" descr="MobileNet Convolutional neural network Machine Learning Algorithms |  Analytics Vidhya">
@@ -5910,7 +6053,7 @@
           <p:nvPr/>
         </p:nvPicPr>
         <p:blipFill>
-          <a:blip r:embed="rId2">
+          <a:blip r:embed="rId3">
             <a:extLst>
               <a:ext uri="{28A0092B-C50C-407E-A947-70E740481C1C}">
                 <a14:useLocalDpi xmlns:a14="http://schemas.microsoft.com/office/drawing/2010/main" val="0"/>
@@ -5924,8 +6067,8 @@
         </p:blipFill>
         <p:spPr bwMode="auto">
           <a:xfrm>
-            <a:off x="5408060" y="2472691"/>
-            <a:ext cx="6591300" cy="2647950"/>
+            <a:off x="5502814" y="2755170"/>
+            <a:ext cx="6097712" cy="2449659"/>
           </a:xfrm>
           <a:prstGeom prst="rect">
             <a:avLst/>
@@ -5968,6 +6111,226 @@
               <a:t>11</a:t>
             </a:fld>
             <a:endParaRPr lang="en-US" dirty="0"/>
+          </a:p>
+        </p:txBody>
+      </p:sp>
+      <p:sp>
+        <p:nvSpPr>
+          <p:cNvPr id="3" name="TextBox 2">
+            <a:extLst>
+              <a:ext uri="{FF2B5EF4-FFF2-40B4-BE49-F238E27FC236}">
+                <a16:creationId xmlns:a16="http://schemas.microsoft.com/office/drawing/2014/main" id="{518A3F1E-90B4-BF4A-9570-51C68EA6B3B9}"/>
+              </a:ext>
+            </a:extLst>
+          </p:cNvPr>
+          <p:cNvSpPr txBox="1"/>
+          <p:nvPr/>
+        </p:nvSpPr>
+        <p:spPr>
+          <a:xfrm>
+            <a:off x="6987751" y="5204829"/>
+            <a:ext cx="3431918" cy="369332"/>
+          </a:xfrm>
+          <a:prstGeom prst="rect">
+            <a:avLst/>
+          </a:prstGeom>
+          <a:noFill/>
+        </p:spPr>
+        <p:txBody>
+          <a:bodyPr wrap="square" rtlCol="0">
+            <a:spAutoFit/>
+          </a:bodyPr>
+          <a:lstStyle/>
+          <a:p>
+            <a:pPr algn="ctr"/>
+            <a:r>
+              <a:rPr lang="en-US" dirty="0" err="1"/>
+              <a:t>MobileNet</a:t>
+            </a:r>
+            <a:r>
+              <a:rPr lang="en-US" dirty="0"/>
+              <a:t> Architecture</a:t>
+            </a:r>
+          </a:p>
+        </p:txBody>
+      </p:sp>
+      <p:sp>
+        <p:nvSpPr>
+          <p:cNvPr id="7" name="Content Placeholder 2">
+            <a:extLst>
+              <a:ext uri="{FF2B5EF4-FFF2-40B4-BE49-F238E27FC236}">
+                <a16:creationId xmlns:a16="http://schemas.microsoft.com/office/drawing/2014/main" id="{BF3CBF52-6CB3-AC48-A066-DA73401E77A9}"/>
+              </a:ext>
+            </a:extLst>
+          </p:cNvPr>
+          <p:cNvSpPr>
+            <a:spLocks noGrp="1"/>
+          </p:cNvSpPr>
+          <p:nvPr>
+            <p:ph idx="1"/>
+          </p:nvPr>
+        </p:nvSpPr>
+        <p:spPr>
+          <a:xfrm>
+            <a:off x="498070" y="1993613"/>
+            <a:ext cx="10058400" cy="4023360"/>
+          </a:xfrm>
+        </p:spPr>
+        <p:txBody>
+          <a:bodyPr>
+            <a:normAutofit/>
+          </a:bodyPr>
+          <a:lstStyle/>
+          <a:p>
+            <a:pPr>
+              <a:buFont typeface="Wingdings" pitchFamily="2" charset="2"/>
+              <a:buChar char="§"/>
+            </a:pPr>
+            <a:r>
+              <a:rPr lang="en-US" dirty="0"/>
+              <a:t>Baseline for inference cost: VGG network</a:t>
+            </a:r>
+          </a:p>
+          <a:p>
+            <a:pPr marL="742950" lvl="1" indent="-285750">
+              <a:buFont typeface="Wingdings" pitchFamily="2" charset="2"/>
+              <a:buChar char="§"/>
+            </a:pPr>
+            <a:r>
+              <a:rPr lang="en-US" dirty="0"/>
+              <a:t> Inference cost = </a:t>
+            </a:r>
+            <a:r>
+              <a:rPr lang="en-US" b="1" dirty="0">
+                <a:solidFill>
+                  <a:srgbClr val="FF0000"/>
+                </a:solidFill>
+              </a:rPr>
+              <a:t>1</a:t>
+            </a:r>
+          </a:p>
+          <a:p>
+            <a:pPr marL="742950" lvl="1" indent="-285750">
+              <a:buFont typeface="Wingdings" pitchFamily="2" charset="2"/>
+              <a:buChar char="§"/>
+            </a:pPr>
+            <a:r>
+              <a:rPr lang="en-US" dirty="0"/>
+              <a:t> Accuracy = </a:t>
+            </a:r>
+            <a:r>
+              <a:rPr lang="en-US" b="1" dirty="0">
+                <a:solidFill>
+                  <a:srgbClr val="FF0000"/>
+                </a:solidFill>
+              </a:rPr>
+              <a:t>59.46%</a:t>
+            </a:r>
+          </a:p>
+          <a:p>
+            <a:pPr>
+              <a:buFont typeface="Wingdings" pitchFamily="2" charset="2"/>
+              <a:buChar char="§"/>
+            </a:pPr>
+            <a:endParaRPr lang="en-US" dirty="0"/>
+          </a:p>
+          <a:p>
+            <a:pPr>
+              <a:buFont typeface="Wingdings" pitchFamily="2" charset="2"/>
+              <a:buChar char="§"/>
+            </a:pPr>
+            <a:endParaRPr lang="en-US" dirty="0"/>
+          </a:p>
+          <a:p>
+            <a:pPr>
+              <a:buFont typeface="Wingdings" pitchFamily="2" charset="2"/>
+              <a:buChar char="§"/>
+            </a:pPr>
+            <a:endParaRPr lang="en-US" dirty="0"/>
+          </a:p>
+          <a:p>
+            <a:pPr>
+              <a:buFont typeface="Wingdings" pitchFamily="2" charset="2"/>
+              <a:buChar char="§"/>
+            </a:pPr>
+            <a:r>
+              <a:rPr lang="en-US" dirty="0"/>
+              <a:t>Unstructured Pruning of </a:t>
+            </a:r>
+            <a:r>
+              <a:rPr lang="en-US" dirty="0" err="1"/>
+              <a:t>MobileNet</a:t>
+            </a:r>
+            <a:r>
+              <a:rPr lang="en-US" dirty="0"/>
+              <a:t> (initial round)</a:t>
+            </a:r>
+          </a:p>
+          <a:p>
+            <a:pPr marL="742950" lvl="1" indent="-285750">
+              <a:buFont typeface="Wingdings" pitchFamily="2" charset="2"/>
+              <a:buChar char="§"/>
+            </a:pPr>
+            <a:r>
+              <a:rPr lang="en-US" dirty="0"/>
+              <a:t> Using </a:t>
+            </a:r>
+            <a:r>
+              <a:rPr lang="en-US" b="1" dirty="0"/>
+              <a:t>P100 GPU </a:t>
+            </a:r>
+            <a:r>
+              <a:rPr lang="en-US" dirty="0"/>
+              <a:t>on Kaggle</a:t>
+            </a:r>
+          </a:p>
+          <a:p>
+            <a:pPr marL="742950" lvl="1" indent="-285750">
+              <a:buFont typeface="Wingdings" pitchFamily="2" charset="2"/>
+              <a:buChar char="§"/>
+            </a:pPr>
+            <a:r>
+              <a:rPr lang="en-US" dirty="0"/>
+              <a:t> Accuracy = </a:t>
+            </a:r>
+            <a:r>
+              <a:rPr lang="en-US" b="1" dirty="0">
+                <a:solidFill>
+                  <a:srgbClr val="FF0000"/>
+                </a:solidFill>
+              </a:rPr>
+              <a:t>56.15%</a:t>
+            </a:r>
+          </a:p>
+          <a:p>
+            <a:pPr marL="742950" lvl="1" indent="-285750">
+              <a:buFont typeface="Wingdings" pitchFamily="2" charset="2"/>
+              <a:buChar char="§"/>
+            </a:pPr>
+            <a:r>
+              <a:rPr lang="en-US" dirty="0"/>
+              <a:t> </a:t>
+            </a:r>
+            <a:r>
+              <a:rPr lang="en-US" b="1" dirty="0">
+                <a:solidFill>
+                  <a:srgbClr val="FF0000"/>
+                </a:solidFill>
+              </a:rPr>
+              <a:t>21x</a:t>
+            </a:r>
+            <a:r>
+              <a:rPr lang="en-US" dirty="0"/>
+              <a:t> inference cost improved (</a:t>
+            </a:r>
+            <a:r>
+              <a:rPr lang="en-US" b="1" dirty="0"/>
+              <a:t>0.046</a:t>
+            </a:r>
+            <a:r>
+              <a:rPr lang="en-US" dirty="0"/>
+              <a:t>)</a:t>
+            </a:r>
           </a:p>
         </p:txBody>
       </p:sp>
@@ -6029,12 +6392,41 @@
           </a:p>
         </p:txBody>
       </p:sp>
+      <p:sp>
+        <p:nvSpPr>
+          <p:cNvPr id="4" name="Slide Number Placeholder 3">
+            <a:extLst>
+              <a:ext uri="{FF2B5EF4-FFF2-40B4-BE49-F238E27FC236}">
+                <a16:creationId xmlns:a16="http://schemas.microsoft.com/office/drawing/2014/main" id="{C0FDA91A-984D-401C-9287-E0B4C6697A76}"/>
+              </a:ext>
+            </a:extLst>
+          </p:cNvPr>
+          <p:cNvSpPr>
+            <a:spLocks noGrp="1"/>
+          </p:cNvSpPr>
+          <p:nvPr>
+            <p:ph type="sldNum" sz="quarter" idx="12"/>
+          </p:nvPr>
+        </p:nvSpPr>
+        <p:spPr/>
+        <p:txBody>
+          <a:bodyPr/>
+          <a:lstStyle/>
+          <a:p>
+            <a:fld id="{6D22F896-40B5-4ADD-8801-0D06FADFA095}" type="slidenum">
+              <a:rPr lang="en-US" smtClean="0"/>
+              <a:t>12</a:t>
+            </a:fld>
+            <a:endParaRPr lang="en-US" dirty="0"/>
+          </a:p>
+        </p:txBody>
+      </p:sp>
       <p:pic>
         <p:nvPicPr>
-          <p:cNvPr id="9" name="Picture 8">
+          <p:cNvPr id="5" name="Picture 4">
             <a:extLst>
               <a:ext uri="{FF2B5EF4-FFF2-40B4-BE49-F238E27FC236}">
-                <a16:creationId xmlns:a16="http://schemas.microsoft.com/office/drawing/2014/main" id="{044BF716-8929-4D1F-9350-7638E06379BC}"/>
+                <a16:creationId xmlns:a16="http://schemas.microsoft.com/office/drawing/2014/main" id="{5096C55E-B233-2641-9990-BDC252667CEE}"/>
               </a:ext>
             </a:extLst>
           </p:cNvPr>
@@ -6044,15 +6436,15 @@
           <p:nvPr/>
         </p:nvPicPr>
         <p:blipFill>
-          <a:blip r:embed="rId2"/>
+          <a:blip r:embed="rId3"/>
           <a:stretch>
             <a:fillRect/>
           </a:stretch>
         </p:blipFill>
         <p:spPr>
           <a:xfrm>
-            <a:off x="4288644" y="2239764"/>
-            <a:ext cx="7515507" cy="3914455"/>
+            <a:off x="4083721" y="1818525"/>
+            <a:ext cx="7865085" cy="4008343"/>
           </a:xfrm>
           <a:prstGeom prst="rect">
             <a:avLst/>
@@ -6061,64 +6453,45 @@
       </p:pic>
       <p:sp>
         <p:nvSpPr>
-          <p:cNvPr id="12" name="TextBox 11">
+          <p:cNvPr id="8" name="Content Placeholder 2">
             <a:extLst>
               <a:ext uri="{FF2B5EF4-FFF2-40B4-BE49-F238E27FC236}">
-                <a16:creationId xmlns:a16="http://schemas.microsoft.com/office/drawing/2014/main" id="{0BE304BD-EEB3-43C2-9502-7376B51F3CAC}"/>
+                <a16:creationId xmlns:a16="http://schemas.microsoft.com/office/drawing/2014/main" id="{245791AE-4189-7D49-8511-29804B97C03C}"/>
               </a:ext>
             </a:extLst>
           </p:cNvPr>
-          <p:cNvSpPr txBox="1"/>
-          <p:nvPr/>
+          <p:cNvSpPr>
+            <a:spLocks noGrp="1"/>
+          </p:cNvSpPr>
+          <p:nvPr>
+            <p:ph idx="1"/>
+          </p:nvPr>
         </p:nvSpPr>
         <p:spPr>
           <a:xfrm>
-            <a:off x="387849" y="1818525"/>
-            <a:ext cx="6097712" cy="4801314"/>
+            <a:off x="498070" y="1995683"/>
+            <a:ext cx="10058400" cy="4023360"/>
           </a:xfrm>
-          <a:prstGeom prst="rect">
-            <a:avLst/>
-          </a:prstGeom>
-          <a:noFill/>
         </p:spPr>
         <p:txBody>
-          <a:bodyPr wrap="square">
-            <a:spAutoFit/>
+          <a:bodyPr>
+            <a:normAutofit lnSpcReduction="10000"/>
           </a:bodyPr>
           <a:lstStyle/>
           <a:p>
             <a:pPr>
-              <a:buFont typeface="Wingdings" panose="05000000000000000000" pitchFamily="2" charset="2"/>
-              <a:buChar char="Ø"/>
+              <a:buFont typeface="Wingdings" pitchFamily="2" charset="2"/>
+              <a:buChar char="§"/>
             </a:pPr>
             <a:r>
-              <a:rPr lang="en-US" dirty="0" err="1"/>
-              <a:t>AaronNet_LARGE</a:t>
-            </a:r>
-            <a:endParaRPr lang="en-US" dirty="0"/>
+              <a:rPr lang="en-US" dirty="0"/>
+              <a:t>Highest Accuracy: AaronNet48+</a:t>
+            </a:r>
           </a:p>
           <a:p>
             <a:pPr lvl="1">
-              <a:buFont typeface="Wingdings" panose="05000000000000000000" pitchFamily="2" charset="2"/>
-              <a:buChar char="Ø"/>
-            </a:pPr>
-            <a:r>
-              <a:rPr lang="en-US" dirty="0"/>
-              <a:t> </a:t>
-            </a:r>
-            <a:r>
-              <a:rPr lang="en-US" dirty="0" err="1"/>
-              <a:t>AaronNet</a:t>
-            </a:r>
-            <a:r>
-              <a:rPr lang="en-US" dirty="0"/>
-              <a:t> with more filters</a:t>
-            </a:r>
-          </a:p>
-          <a:p>
-            <a:pPr lvl="1">
-              <a:buFont typeface="Wingdings" panose="05000000000000000000" pitchFamily="2" charset="2"/>
-              <a:buChar char="Ø"/>
+              <a:buFont typeface="Wingdings" pitchFamily="2" charset="2"/>
+              <a:buChar char="§"/>
             </a:pPr>
             <a:r>
               <a:rPr lang="en-US" dirty="0"/>
@@ -6135,8 +6508,8 @@
           </a:p>
           <a:p>
             <a:pPr lvl="1">
-              <a:buFont typeface="Wingdings" panose="05000000000000000000" pitchFamily="2" charset="2"/>
-              <a:buChar char="Ø"/>
+              <a:buFont typeface="Wingdings" pitchFamily="2" charset="2"/>
+              <a:buChar char="§"/>
             </a:pPr>
             <a:r>
               <a:rPr lang="en-US" dirty="0"/>
@@ -6165,117 +6538,32 @@
           </a:p>
           <a:p>
             <a:pPr lvl="1">
-              <a:buFont typeface="Wingdings" panose="05000000000000000000" pitchFamily="2" charset="2"/>
-              <a:buChar char="Ø"/>
+              <a:buFont typeface="Wingdings" pitchFamily="2" charset="2"/>
+              <a:buChar char="§"/>
             </a:pPr>
             <a:endParaRPr lang="en-US" dirty="0"/>
           </a:p>
           <a:p>
+            <a:pPr lvl="1">
+              <a:buFont typeface="Wingdings" pitchFamily="2" charset="2"/>
+              <a:buChar char="§"/>
+            </a:pPr>
+            <a:endParaRPr lang="en-US" dirty="0"/>
+          </a:p>
+          <a:p>
             <a:pPr>
-              <a:buFont typeface="Wingdings" panose="05000000000000000000" pitchFamily="2" charset="2"/>
-              <a:buChar char="Ø"/>
+              <a:buFont typeface="Wingdings" pitchFamily="2" charset="2"/>
+              <a:buChar char="§"/>
             </a:pPr>
             <a:r>
-              <a:rPr lang="en-US" dirty="0" err="1"/>
-              <a:t>AaronNet</a:t>
-            </a:r>
-            <a:endParaRPr lang="en-US" dirty="0"/>
+              <a:rPr lang="en-US" dirty="0"/>
+              <a:t>Best Cost: AaronNet32++</a:t>
+            </a:r>
           </a:p>
           <a:p>
             <a:pPr lvl="1">
-              <a:buFont typeface="Wingdings" panose="05000000000000000000" pitchFamily="2" charset="2"/>
-              <a:buChar char="Ø"/>
-            </a:pPr>
-            <a:r>
-              <a:rPr lang="en-US" dirty="0"/>
-              <a:t> Base net used for pruning</a:t>
-            </a:r>
-          </a:p>
-          <a:p>
-            <a:pPr lvl="1">
-              <a:buFont typeface="Wingdings" panose="05000000000000000000" pitchFamily="2" charset="2"/>
-              <a:buChar char="Ø"/>
-            </a:pPr>
-            <a:r>
-              <a:rPr lang="en-US" dirty="0"/>
-              <a:t> Accuracy = </a:t>
-            </a:r>
-            <a:r>
-              <a:rPr lang="en-US" b="1" dirty="0">
-                <a:solidFill>
-                  <a:srgbClr val="FF0000"/>
-                </a:solidFill>
-              </a:rPr>
-              <a:t>58.48</a:t>
-            </a:r>
-          </a:p>
-          <a:p>
-            <a:pPr lvl="1">
-              <a:buFont typeface="Wingdings" panose="05000000000000000000" pitchFamily="2" charset="2"/>
-              <a:buChar char="Ø"/>
-            </a:pPr>
-            <a:r>
-              <a:rPr lang="en-US" dirty="0"/>
-              <a:t> </a:t>
-            </a:r>
-            <a:r>
-              <a:rPr lang="en-US" b="1" dirty="0">
-                <a:solidFill>
-                  <a:srgbClr val="FF0000"/>
-                </a:solidFill>
-              </a:rPr>
-              <a:t>17x</a:t>
-            </a:r>
-            <a:r>
-              <a:rPr lang="en-US" dirty="0"/>
-              <a:t> inference cost </a:t>
-            </a:r>
-            <a:r>
-              <a:rPr lang="en-US" b="1" dirty="0"/>
-              <a:t>(0.05722</a:t>
-            </a:r>
-            <a:r>
-              <a:rPr lang="en-US" dirty="0"/>
-              <a:t>)</a:t>
-            </a:r>
-          </a:p>
-          <a:p>
-            <a:pPr lvl="1">
-              <a:buFont typeface="Wingdings" panose="05000000000000000000" pitchFamily="2" charset="2"/>
-              <a:buChar char="Ø"/>
-            </a:pPr>
-            <a:endParaRPr lang="en-US" dirty="0"/>
-          </a:p>
-          <a:p>
-            <a:pPr>
-              <a:buFont typeface="Wingdings" panose="05000000000000000000" pitchFamily="2" charset="2"/>
-              <a:buChar char="Ø"/>
-            </a:pPr>
-            <a:r>
-              <a:rPr lang="en-US" dirty="0" err="1"/>
-              <a:t>AaronNet_SMALL</a:t>
-            </a:r>
-            <a:endParaRPr lang="en-US" dirty="0"/>
-          </a:p>
-          <a:p>
-            <a:pPr lvl="1">
-              <a:buFont typeface="Wingdings" panose="05000000000000000000" pitchFamily="2" charset="2"/>
-              <a:buChar char="Ø"/>
-            </a:pPr>
-            <a:r>
-              <a:rPr lang="en-US" dirty="0"/>
-              <a:t> Pruned </a:t>
-            </a:r>
-            <a:r>
-              <a:rPr lang="en-US" dirty="0" err="1"/>
-              <a:t>AaronNet</a:t>
-            </a:r>
-            <a:endParaRPr lang="en-US" dirty="0"/>
-          </a:p>
-          <a:p>
-            <a:pPr lvl="1">
-              <a:buFont typeface="Wingdings" panose="05000000000000000000" pitchFamily="2" charset="2"/>
-              <a:buChar char="Ø"/>
+              <a:buFont typeface="Wingdings" pitchFamily="2" charset="2"/>
+              <a:buChar char="§"/>
             </a:pPr>
             <a:r>
               <a:rPr lang="en-US" dirty="0"/>
@@ -6292,8 +6580,8 @@
           </a:p>
           <a:p>
             <a:pPr lvl="1">
-              <a:buFont typeface="Wingdings" panose="05000000000000000000" pitchFamily="2" charset="2"/>
-              <a:buChar char="Ø"/>
+              <a:buFont typeface="Wingdings" pitchFamily="2" charset="2"/>
+              <a:buChar char="§"/>
             </a:pPr>
             <a:r>
               <a:rPr lang="en-US" dirty="0"/>
@@ -6322,70 +6610,31 @@
           </a:p>
           <a:p>
             <a:pPr>
-              <a:buFont typeface="Wingdings" panose="05000000000000000000" pitchFamily="2" charset="2"/>
-              <a:buChar char="Ø"/>
+              <a:buFont typeface="Wingdings" pitchFamily="2" charset="2"/>
+              <a:buChar char="§"/>
             </a:pPr>
             <a:endParaRPr lang="en-US" dirty="0"/>
           </a:p>
           <a:p>
             <a:pPr>
-              <a:buFont typeface="Wingdings" panose="05000000000000000000" pitchFamily="2" charset="2"/>
-              <a:buChar char="Ø"/>
+              <a:buFont typeface="Wingdings" pitchFamily="2" charset="2"/>
+              <a:buChar char="§"/>
             </a:pPr>
+            <a:endParaRPr lang="en-US" dirty="0"/>
+          </a:p>
+          <a:p>
+            <a:pPr>
+              <a:buFont typeface="Wingdings" pitchFamily="2" charset="2"/>
+              <a:buChar char="§"/>
+            </a:pPr>
             <a:r>
               <a:rPr lang="en-US" dirty="0"/>
               <a:t>Using </a:t>
             </a:r>
             <a:r>
               <a:rPr lang="en-US" b="1" dirty="0"/>
-              <a:t>A6000 RTX GPU </a:t>
-            </a:r>
-            <a:r>
-              <a:rPr lang="en-US" dirty="0"/>
-              <a:t>(</a:t>
-            </a:r>
-            <a:r>
-              <a:rPr lang="en-US" dirty="0" err="1"/>
-              <a:t>LambdaLabs</a:t>
-            </a:r>
-            <a:r>
-              <a:rPr lang="en-US" dirty="0"/>
-              <a:t>)</a:t>
-            </a:r>
-          </a:p>
-          <a:p>
-            <a:r>
-              <a:rPr lang="en-US" dirty="0"/>
-              <a:t> </a:t>
-            </a:r>
-          </a:p>
-        </p:txBody>
-      </p:sp>
-      <p:sp>
-        <p:nvSpPr>
-          <p:cNvPr id="4" name="Slide Number Placeholder 3">
-            <a:extLst>
-              <a:ext uri="{FF2B5EF4-FFF2-40B4-BE49-F238E27FC236}">
-                <a16:creationId xmlns:a16="http://schemas.microsoft.com/office/drawing/2014/main" id="{C0FDA91A-984D-401C-9287-E0B4C6697A76}"/>
-              </a:ext>
-            </a:extLst>
-          </p:cNvPr>
-          <p:cNvSpPr>
-            <a:spLocks noGrp="1"/>
-          </p:cNvSpPr>
-          <p:nvPr>
-            <p:ph type="sldNum" sz="quarter" idx="12"/>
-          </p:nvPr>
-        </p:nvSpPr>
-        <p:spPr/>
-        <p:txBody>
-          <a:bodyPr/>
-          <a:lstStyle/>
-          <a:p>
-            <a:fld id="{6D22F896-40B5-4ADD-8801-0D06FADFA095}" type="slidenum">
-              <a:rPr lang="en-US" smtClean="0"/>
-              <a:t>12</a:t>
-            </a:fld>
+              <a:t>A6000 RTX GPU</a:t>
+            </a:r>
             <a:endParaRPr lang="en-US" dirty="0"/>
           </a:p>
         </p:txBody>
@@ -6404,6 +6653,240 @@
 </file>
 
 <file path=ppt/slides/slide13.xml><?xml version="1.0" encoding="utf-8"?>
+<p:sld xmlns:a="http://schemas.openxmlformats.org/drawingml/2006/main" xmlns:r="http://schemas.openxmlformats.org/officeDocument/2006/relationships" xmlns:p="http://schemas.openxmlformats.org/presentationml/2006/main">
+  <p:cSld>
+    <p:spTree>
+      <p:nvGrpSpPr>
+        <p:cNvPr id="1" name=""/>
+        <p:cNvGrpSpPr/>
+        <p:nvPr/>
+      </p:nvGrpSpPr>
+      <p:grpSpPr>
+        <a:xfrm>
+          <a:off x="0" y="0"/>
+          <a:ext cx="0" cy="0"/>
+          <a:chOff x="0" y="0"/>
+          <a:chExt cx="0" cy="0"/>
+        </a:xfrm>
+      </p:grpSpPr>
+      <p:sp>
+        <p:nvSpPr>
+          <p:cNvPr id="2" name="Title 1">
+            <a:extLst>
+              <a:ext uri="{FF2B5EF4-FFF2-40B4-BE49-F238E27FC236}">
+                <a16:creationId xmlns:a16="http://schemas.microsoft.com/office/drawing/2014/main" id="{1E8B10C2-979E-46B7-8EAD-118DB369F623}"/>
+              </a:ext>
+            </a:extLst>
+          </p:cNvPr>
+          <p:cNvSpPr>
+            <a:spLocks noGrp="1"/>
+          </p:cNvSpPr>
+          <p:nvPr>
+            <p:ph type="title"/>
+          </p:nvPr>
+        </p:nvSpPr>
+        <p:spPr/>
+        <p:txBody>
+          <a:bodyPr/>
+          <a:lstStyle/>
+          <a:p>
+            <a:r>
+              <a:rPr lang="en-US" dirty="0"/>
+              <a:t>Results: Final Round</a:t>
+            </a:r>
+          </a:p>
+        </p:txBody>
+      </p:sp>
+      <p:sp>
+        <p:nvSpPr>
+          <p:cNvPr id="4" name="Slide Number Placeholder 3">
+            <a:extLst>
+              <a:ext uri="{FF2B5EF4-FFF2-40B4-BE49-F238E27FC236}">
+                <a16:creationId xmlns:a16="http://schemas.microsoft.com/office/drawing/2014/main" id="{C0FDA91A-984D-401C-9287-E0B4C6697A76}"/>
+              </a:ext>
+            </a:extLst>
+          </p:cNvPr>
+          <p:cNvSpPr>
+            <a:spLocks noGrp="1"/>
+          </p:cNvSpPr>
+          <p:nvPr>
+            <p:ph type="sldNum" sz="quarter" idx="12"/>
+          </p:nvPr>
+        </p:nvSpPr>
+        <p:spPr/>
+        <p:txBody>
+          <a:bodyPr/>
+          <a:lstStyle/>
+          <a:p>
+            <a:fld id="{6D22F896-40B5-4ADD-8801-0D06FADFA095}" type="slidenum">
+              <a:rPr lang="en-US" smtClean="0"/>
+              <a:t>13</a:t>
+            </a:fld>
+            <a:endParaRPr lang="en-US" dirty="0"/>
+          </a:p>
+        </p:txBody>
+      </p:sp>
+      <p:pic>
+        <p:nvPicPr>
+          <p:cNvPr id="3" name="Picture 2">
+            <a:extLst>
+              <a:ext uri="{FF2B5EF4-FFF2-40B4-BE49-F238E27FC236}">
+                <a16:creationId xmlns:a16="http://schemas.microsoft.com/office/drawing/2014/main" id="{7248BC08-B74C-9E41-8319-A34F78487A4C}"/>
+              </a:ext>
+            </a:extLst>
+          </p:cNvPr>
+          <p:cNvPicPr>
+            <a:picLocks noChangeAspect="1"/>
+          </p:cNvPicPr>
+          <p:nvPr/>
+        </p:nvPicPr>
+        <p:blipFill>
+          <a:blip r:embed="rId3"/>
+          <a:stretch>
+            <a:fillRect/>
+          </a:stretch>
+        </p:blipFill>
+        <p:spPr>
+          <a:xfrm>
+            <a:off x="2960253" y="2048086"/>
+            <a:ext cx="6332453" cy="4100973"/>
+          </a:xfrm>
+          <a:prstGeom prst="rect">
+            <a:avLst/>
+          </a:prstGeom>
+        </p:spPr>
+      </p:pic>
+    </p:spTree>
+    <p:extLst>
+      <p:ext uri="{BB962C8B-B14F-4D97-AF65-F5344CB8AC3E}">
+        <p14:creationId xmlns:p14="http://schemas.microsoft.com/office/powerpoint/2010/main" val="770803159"/>
+      </p:ext>
+    </p:extLst>
+  </p:cSld>
+  <p:clrMapOvr>
+    <a:masterClrMapping/>
+  </p:clrMapOvr>
+</p:sld>
+</file>
+
+<file path=ppt/slides/slide14.xml><?xml version="1.0" encoding="utf-8"?>
+<p:sld xmlns:a="http://schemas.openxmlformats.org/drawingml/2006/main" xmlns:r="http://schemas.openxmlformats.org/officeDocument/2006/relationships" xmlns:p="http://schemas.openxmlformats.org/presentationml/2006/main">
+  <p:cSld>
+    <p:spTree>
+      <p:nvGrpSpPr>
+        <p:cNvPr id="1" name=""/>
+        <p:cNvGrpSpPr/>
+        <p:nvPr/>
+      </p:nvGrpSpPr>
+      <p:grpSpPr>
+        <a:xfrm>
+          <a:off x="0" y="0"/>
+          <a:ext cx="0" cy="0"/>
+          <a:chOff x="0" y="0"/>
+          <a:chExt cx="0" cy="0"/>
+        </a:xfrm>
+      </p:grpSpPr>
+      <p:sp>
+        <p:nvSpPr>
+          <p:cNvPr id="2" name="Title 1">
+            <a:extLst>
+              <a:ext uri="{FF2B5EF4-FFF2-40B4-BE49-F238E27FC236}">
+                <a16:creationId xmlns:a16="http://schemas.microsoft.com/office/drawing/2014/main" id="{1E8B10C2-979E-46B7-8EAD-118DB369F623}"/>
+              </a:ext>
+            </a:extLst>
+          </p:cNvPr>
+          <p:cNvSpPr>
+            <a:spLocks noGrp="1"/>
+          </p:cNvSpPr>
+          <p:nvPr>
+            <p:ph type="title"/>
+          </p:nvPr>
+        </p:nvSpPr>
+        <p:spPr/>
+        <p:txBody>
+          <a:bodyPr/>
+          <a:lstStyle/>
+          <a:p>
+            <a:r>
+              <a:rPr lang="en-US" dirty="0"/>
+              <a:t>Results: Final Standing</a:t>
+            </a:r>
+          </a:p>
+        </p:txBody>
+      </p:sp>
+      <p:sp>
+        <p:nvSpPr>
+          <p:cNvPr id="4" name="Slide Number Placeholder 3">
+            <a:extLst>
+              <a:ext uri="{FF2B5EF4-FFF2-40B4-BE49-F238E27FC236}">
+                <a16:creationId xmlns:a16="http://schemas.microsoft.com/office/drawing/2014/main" id="{C0FDA91A-984D-401C-9287-E0B4C6697A76}"/>
+              </a:ext>
+            </a:extLst>
+          </p:cNvPr>
+          <p:cNvSpPr>
+            <a:spLocks noGrp="1"/>
+          </p:cNvSpPr>
+          <p:nvPr>
+            <p:ph type="sldNum" sz="quarter" idx="12"/>
+          </p:nvPr>
+        </p:nvSpPr>
+        <p:spPr/>
+        <p:txBody>
+          <a:bodyPr/>
+          <a:lstStyle/>
+          <a:p>
+            <a:fld id="{6D22F896-40B5-4ADD-8801-0D06FADFA095}" type="slidenum">
+              <a:rPr lang="en-US" smtClean="0"/>
+              <a:t>14</a:t>
+            </a:fld>
+            <a:endParaRPr lang="en-US" dirty="0"/>
+          </a:p>
+        </p:txBody>
+      </p:sp>
+      <p:pic>
+        <p:nvPicPr>
+          <p:cNvPr id="6" name="Picture 5">
+            <a:extLst>
+              <a:ext uri="{FF2B5EF4-FFF2-40B4-BE49-F238E27FC236}">
+                <a16:creationId xmlns:a16="http://schemas.microsoft.com/office/drawing/2014/main" id="{9A5442D5-2354-C14B-82A6-04546D94AC85}"/>
+              </a:ext>
+            </a:extLst>
+          </p:cNvPr>
+          <p:cNvPicPr>
+            <a:picLocks noChangeAspect="1"/>
+          </p:cNvPicPr>
+          <p:nvPr/>
+        </p:nvPicPr>
+        <p:blipFill>
+          <a:blip r:embed="rId3"/>
+          <a:stretch>
+            <a:fillRect/>
+          </a:stretch>
+        </p:blipFill>
+        <p:spPr>
+          <a:xfrm>
+            <a:off x="2778746" y="2113587"/>
+            <a:ext cx="6695467" cy="3969970"/>
+          </a:xfrm>
+          <a:prstGeom prst="rect">
+            <a:avLst/>
+          </a:prstGeom>
+        </p:spPr>
+      </p:pic>
+    </p:spTree>
+    <p:extLst>
+      <p:ext uri="{BB962C8B-B14F-4D97-AF65-F5344CB8AC3E}">
+        <p14:creationId xmlns:p14="http://schemas.microsoft.com/office/powerpoint/2010/main" val="180653380"/>
+      </p:ext>
+    </p:extLst>
+  </p:cSld>
+  <p:clrMapOvr>
+    <a:masterClrMapping/>
+  </p:clrMapOvr>
+</p:sld>
+</file>
+
+<file path=ppt/slides/slide15.xml><?xml version="1.0" encoding="utf-8"?>
 <p:sld xmlns:a="http://schemas.openxmlformats.org/drawingml/2006/main" xmlns:r="http://schemas.openxmlformats.org/officeDocument/2006/relationships" xmlns:p="http://schemas.openxmlformats.org/presentationml/2006/main">
   <p:cSld>
     <p:spTree>
@@ -6523,7 +7006,7 @@
           <a:p>
             <a:fld id="{6D22F896-40B5-4ADD-8801-0D06FADFA095}" type="slidenum">
               <a:rPr lang="en-US" smtClean="0"/>
-              <a:t>13</a:t>
+              <a:t>15</a:t>
             </a:fld>
             <a:endParaRPr lang="en-US" dirty="0"/>
           </a:p>
@@ -7120,7 +7603,12 @@
             <p:ph idx="1"/>
           </p:nvPr>
         </p:nvSpPr>
-        <p:spPr/>
+        <p:spPr>
+          <a:xfrm>
+            <a:off x="1097280" y="1845733"/>
+            <a:ext cx="10058400" cy="4725663"/>
+          </a:xfrm>
+        </p:spPr>
         <p:txBody>
           <a:bodyPr>
             <a:normAutofit/>
@@ -7167,19 +7655,6 @@
               <a:rPr lang="en-US" b="1" dirty="0"/>
               <a:t>low latency</a:t>
             </a:r>
-          </a:p>
-          <a:p>
-            <a:pPr lvl="1">
-              <a:buFont typeface="Wingdings" panose="05000000000000000000" pitchFamily="2" charset="2"/>
-              <a:buChar char="§"/>
-            </a:pPr>
-            <a:endParaRPr lang="en-US" dirty="0"/>
-          </a:p>
-          <a:p>
-            <a:pPr lvl="1">
-              <a:buFont typeface="Wingdings" panose="05000000000000000000" pitchFamily="2" charset="2"/>
-              <a:buChar char="§"/>
-            </a:pPr>
             <a:endParaRPr lang="en-US" dirty="0"/>
           </a:p>
           <a:p>
@@ -7256,7 +7731,7 @@
         </p:blipFill>
         <p:spPr>
           <a:xfrm>
-            <a:off x="4755166" y="2835667"/>
+            <a:off x="2408063" y="4514457"/>
             <a:ext cx="7436834" cy="1846683"/>
           </a:xfrm>
           <a:prstGeom prst="rect">
@@ -7647,16 +8122,24 @@
           <a:p>
             <a:r>
               <a:rPr lang="en-US" dirty="0"/>
-              <a:t>In RF-Domain, we generally require hardware implementation.</a:t>
-            </a:r>
-          </a:p>
-          <a:p>
-            <a:endParaRPr lang="en-US" dirty="0"/>
-          </a:p>
-          <a:p>
-            <a:r>
-              <a:rPr lang="en-US" dirty="0"/>
-              <a:t>Hardware implementation performance indexes:</a:t>
+              <a:t>In RF-Domain, we generally require </a:t>
+            </a:r>
+            <a:r>
+              <a:rPr lang="en-US" b="1" dirty="0"/>
+              <a:t>hardware implementation</a:t>
+            </a:r>
+            <a:r>
+              <a:rPr lang="en-US" dirty="0"/>
+              <a:t>.</a:t>
+            </a:r>
+          </a:p>
+          <a:p>
+            <a:endParaRPr lang="en-US" dirty="0"/>
+          </a:p>
+          <a:p>
+            <a:r>
+              <a:rPr lang="en-US" dirty="0"/>
+              <a:t>H/W performance indexes:</a:t>
             </a:r>
           </a:p>
           <a:p>
@@ -7797,8 +8280,8 @@
         </p:blipFill>
         <p:spPr>
           <a:xfrm>
-            <a:off x="6380636" y="2665008"/>
-            <a:ext cx="5268137" cy="1699798"/>
+            <a:off x="4437611" y="2377192"/>
+            <a:ext cx="6880422" cy="2220012"/>
           </a:xfrm>
           <a:prstGeom prst="rect">
             <a:avLst/>
@@ -7975,7 +8458,7 @@
             </a:pPr>
             <a:r>
               <a:rPr lang="en-US" dirty="0"/>
-              <a:t> Exhaustive search options</a:t>
+              <a:t> First option: Exhaustive search</a:t>
             </a:r>
           </a:p>
           <a:p>
@@ -8024,9 +8507,21 @@
             </a:r>
             <a:r>
               <a:rPr lang="en-CA" b="1" dirty="0"/>
-              <a:t>Resource Hungry</a:t>
-            </a:r>
-            <a:endParaRPr lang="en-US" b="1" dirty="0"/>
+              <a:t>Resource Hungry </a:t>
+            </a:r>
+            <a:r>
+              <a:rPr lang="en-CA" dirty="0"/>
+              <a:t>for</a:t>
+            </a:r>
+            <a:r>
+              <a:rPr lang="en-CA" b="1" dirty="0"/>
+              <a:t> </a:t>
+            </a:r>
+            <a:r>
+              <a:rPr lang="en-CA" dirty="0"/>
+              <a:t>large Datasets</a:t>
+            </a:r>
+            <a:endParaRPr lang="en-US" dirty="0"/>
           </a:p>
           <a:p>
             <a:pPr lvl="1">
@@ -8094,8 +8589,8 @@
         </p:blipFill>
         <p:spPr>
           <a:xfrm>
-            <a:off x="6338566" y="2085580"/>
-            <a:ext cx="5166436" cy="2959031"/>
+            <a:off x="6467380" y="2085581"/>
+            <a:ext cx="5037622" cy="2885254"/>
           </a:xfrm>
           <a:prstGeom prst="rect">
             <a:avLst/>
@@ -8166,291 +8661,6 @@
           <p:cNvPr id="2" name="Title 1">
             <a:extLst>
               <a:ext uri="{FF2B5EF4-FFF2-40B4-BE49-F238E27FC236}">
-                <a16:creationId xmlns:a16="http://schemas.microsoft.com/office/drawing/2014/main" id="{4F2FB2D6-A03B-45B4-B104-D1A6DA85DB32}"/>
-              </a:ext>
-            </a:extLst>
-          </p:cNvPr>
-          <p:cNvSpPr>
-            <a:spLocks noGrp="1"/>
-          </p:cNvSpPr>
-          <p:nvPr>
-            <p:ph type="title"/>
-          </p:nvPr>
-        </p:nvSpPr>
-        <p:spPr/>
-        <p:txBody>
-          <a:bodyPr/>
-          <a:lstStyle/>
-          <a:p>
-            <a:r>
-              <a:rPr lang="en-US" dirty="0"/>
-              <a:t>Possible DNNs</a:t>
-            </a:r>
-          </a:p>
-        </p:txBody>
-      </p:sp>
-      <p:sp>
-        <p:nvSpPr>
-          <p:cNvPr id="3" name="Content Placeholder 2">
-            <a:extLst>
-              <a:ext uri="{FF2B5EF4-FFF2-40B4-BE49-F238E27FC236}">
-                <a16:creationId xmlns:a16="http://schemas.microsoft.com/office/drawing/2014/main" id="{12027CD1-1B63-4496-BD55-C68EEFA3E19F}"/>
-              </a:ext>
-            </a:extLst>
-          </p:cNvPr>
-          <p:cNvSpPr>
-            <a:spLocks noGrp="1"/>
-          </p:cNvSpPr>
-          <p:nvPr>
-            <p:ph idx="1"/>
-          </p:nvPr>
-        </p:nvSpPr>
-        <p:spPr>
-          <a:xfrm>
-            <a:off x="1146083" y="1911938"/>
-            <a:ext cx="5362130" cy="3924810"/>
-          </a:xfrm>
-        </p:spPr>
-        <p:txBody>
-          <a:bodyPr>
-            <a:normAutofit/>
-          </a:bodyPr>
-          <a:lstStyle/>
-          <a:p>
-            <a:pPr>
-              <a:buFont typeface="Wingdings" panose="05000000000000000000" pitchFamily="2" charset="2"/>
-              <a:buChar char="§"/>
-            </a:pPr>
-            <a:r>
-              <a:rPr lang="en-US" dirty="0"/>
-              <a:t> VGG, Inception, </a:t>
-            </a:r>
-            <a:r>
-              <a:rPr lang="en-US" dirty="0" err="1"/>
-              <a:t>ResNet</a:t>
-            </a:r>
-            <a:r>
-              <a:rPr lang="en-US" dirty="0"/>
-              <a:t>, </a:t>
-            </a:r>
-            <a:r>
-              <a:rPr lang="en-US" dirty="0" err="1"/>
-              <a:t>MobileNet</a:t>
-            </a:r>
-            <a:r>
-              <a:rPr lang="en-US" dirty="0"/>
-              <a:t>, </a:t>
-            </a:r>
-            <a:r>
-              <a:rPr lang="en-US" dirty="0" err="1"/>
-              <a:t>ShuffleNet</a:t>
-            </a:r>
-            <a:endParaRPr lang="en-US" dirty="0"/>
-          </a:p>
-          <a:p>
-            <a:pPr lvl="1">
-              <a:buFont typeface="Wingdings" panose="05000000000000000000" pitchFamily="2" charset="2"/>
-              <a:buChar char="§"/>
-            </a:pPr>
-            <a:r>
-              <a:rPr lang="en-US" dirty="0"/>
-              <a:t> Each networks has innovations to stand out</a:t>
-            </a:r>
-          </a:p>
-          <a:p>
-            <a:pPr lvl="1">
-              <a:buFont typeface="Wingdings" panose="05000000000000000000" pitchFamily="2" charset="2"/>
-              <a:buChar char="§"/>
-            </a:pPr>
-            <a:endParaRPr lang="en-US" dirty="0"/>
-          </a:p>
-          <a:p>
-            <a:pPr marL="201168" lvl="1" indent="0">
-              <a:buNone/>
-            </a:pPr>
-            <a:r>
-              <a:rPr lang="en-US" b="1" dirty="0" err="1"/>
-              <a:t>MobileNet</a:t>
-            </a:r>
-            <a:endParaRPr lang="en-US" b="1" dirty="0"/>
-          </a:p>
-          <a:p>
-            <a:pPr>
-              <a:buFont typeface="Wingdings" panose="05000000000000000000" pitchFamily="2" charset="2"/>
-              <a:buChar char="§"/>
-            </a:pPr>
-            <a:r>
-              <a:rPr lang="en-US" dirty="0"/>
-              <a:t> Pointwise and </a:t>
-            </a:r>
-            <a:r>
-              <a:rPr lang="en-US" dirty="0" err="1"/>
-              <a:t>depthwise</a:t>
-            </a:r>
-            <a:r>
-              <a:rPr lang="en-US" dirty="0"/>
-              <a:t> convolution</a:t>
-            </a:r>
-          </a:p>
-          <a:p>
-            <a:pPr lvl="1">
-              <a:buFont typeface="Wingdings" panose="05000000000000000000" pitchFamily="2" charset="2"/>
-              <a:buChar char="§"/>
-            </a:pPr>
-            <a:r>
-              <a:rPr lang="en-US" dirty="0"/>
-              <a:t>Reducing the number of multiplications</a:t>
-            </a:r>
-          </a:p>
-          <a:p>
-            <a:pPr lvl="1">
-              <a:buFont typeface="Wingdings" panose="05000000000000000000" pitchFamily="2" charset="2"/>
-              <a:buChar char="§"/>
-            </a:pPr>
-            <a:r>
-              <a:rPr lang="en-US" dirty="0"/>
-              <a:t>More </a:t>
-            </a:r>
-            <a:r>
-              <a:rPr lang="en-US" b="1" dirty="0"/>
-              <a:t>processing power </a:t>
-            </a:r>
-            <a:r>
-              <a:rPr lang="en-US" dirty="0"/>
-              <a:t>in </a:t>
-            </a:r>
-            <a:r>
-              <a:rPr lang="en-US" b="1" dirty="0"/>
-              <a:t>shorter time</a:t>
-            </a:r>
-          </a:p>
-          <a:p>
-            <a:pPr lvl="1">
-              <a:buFont typeface="Wingdings" panose="05000000000000000000" pitchFamily="2" charset="2"/>
-              <a:buChar char="§"/>
-            </a:pPr>
-            <a:endParaRPr lang="en-US" dirty="0"/>
-          </a:p>
-          <a:p>
-            <a:pPr lvl="1">
-              <a:buFont typeface="Wingdings" panose="05000000000000000000" pitchFamily="2" charset="2"/>
-              <a:buChar char="§"/>
-            </a:pPr>
-            <a:endParaRPr lang="en-US" dirty="0"/>
-          </a:p>
-        </p:txBody>
-      </p:sp>
-      <p:pic>
-        <p:nvPicPr>
-          <p:cNvPr id="1026" name="Picture 2" descr="Review: Xception — With Depthwise Separable Convolution, Better Than  Inception-v3 (Image Classification) | by Sik-Ho Tsang | Towards Data Science">
-            <a:extLst>
-              <a:ext uri="{FF2B5EF4-FFF2-40B4-BE49-F238E27FC236}">
-                <a16:creationId xmlns:a16="http://schemas.microsoft.com/office/drawing/2014/main" id="{33DD17A2-CBF2-4CB3-9E69-CE470A4FA5F0}"/>
-              </a:ext>
-            </a:extLst>
-          </p:cNvPr>
-          <p:cNvPicPr>
-            <a:picLocks noChangeAspect="1" noChangeArrowheads="1"/>
-          </p:cNvPicPr>
-          <p:nvPr/>
-        </p:nvPicPr>
-        <p:blipFill>
-          <a:blip r:embed="rId3">
-            <a:extLst>
-              <a:ext uri="{28A0092B-C50C-407E-A947-70E740481C1C}">
-                <a14:useLocalDpi xmlns:a14="http://schemas.microsoft.com/office/drawing/2010/main" val="0"/>
-              </a:ext>
-            </a:extLst>
-          </a:blip>
-          <a:srcRect/>
-          <a:stretch>
-            <a:fillRect/>
-          </a:stretch>
-        </p:blipFill>
-        <p:spPr bwMode="auto">
-          <a:xfrm>
-            <a:off x="6395855" y="2319035"/>
-            <a:ext cx="4725273" cy="3372848"/>
-          </a:xfrm>
-          <a:prstGeom prst="rect">
-            <a:avLst/>
-          </a:prstGeom>
-          <a:noFill/>
-          <a:extLst>
-            <a:ext uri="{909E8E84-426E-40DD-AFC4-6F175D3DCCD1}">
-              <a14:hiddenFill xmlns:a14="http://schemas.microsoft.com/office/drawing/2010/main">
-                <a:solidFill>
-                  <a:srgbClr val="FFFFFF"/>
-                </a:solidFill>
-              </a14:hiddenFill>
-            </a:ext>
-          </a:extLst>
-        </p:spPr>
-      </p:pic>
-      <p:sp>
-        <p:nvSpPr>
-          <p:cNvPr id="5" name="Slide Number Placeholder 4">
-            <a:extLst>
-              <a:ext uri="{FF2B5EF4-FFF2-40B4-BE49-F238E27FC236}">
-                <a16:creationId xmlns:a16="http://schemas.microsoft.com/office/drawing/2014/main" id="{A8E715FD-B778-4967-AE51-EFAE44629622}"/>
-              </a:ext>
-            </a:extLst>
-          </p:cNvPr>
-          <p:cNvSpPr>
-            <a:spLocks noGrp="1"/>
-          </p:cNvSpPr>
-          <p:nvPr>
-            <p:ph type="sldNum" sz="quarter" idx="12"/>
-          </p:nvPr>
-        </p:nvSpPr>
-        <p:spPr/>
-        <p:txBody>
-          <a:bodyPr/>
-          <a:lstStyle/>
-          <a:p>
-            <a:fld id="{6D22F896-40B5-4ADD-8801-0D06FADFA095}" type="slidenum">
-              <a:rPr lang="en-US" smtClean="0"/>
-              <a:t>7</a:t>
-            </a:fld>
-            <a:endParaRPr lang="en-US" dirty="0"/>
-          </a:p>
-        </p:txBody>
-      </p:sp>
-    </p:spTree>
-    <p:extLst>
-      <p:ext uri="{BB962C8B-B14F-4D97-AF65-F5344CB8AC3E}">
-        <p14:creationId xmlns:p14="http://schemas.microsoft.com/office/powerpoint/2010/main" val="1438874182"/>
-      </p:ext>
-    </p:extLst>
-  </p:cSld>
-  <p:clrMapOvr>
-    <a:masterClrMapping/>
-  </p:clrMapOvr>
-</p:sld>
-</file>
-
-<file path=ppt/slides/slide8.xml><?xml version="1.0" encoding="utf-8"?>
-<p:sld xmlns:a="http://schemas.openxmlformats.org/drawingml/2006/main" xmlns:r="http://schemas.openxmlformats.org/officeDocument/2006/relationships" xmlns:p="http://schemas.openxmlformats.org/presentationml/2006/main">
-  <p:cSld>
-    <p:spTree>
-      <p:nvGrpSpPr>
-        <p:cNvPr id="1" name=""/>
-        <p:cNvGrpSpPr/>
-        <p:nvPr/>
-      </p:nvGrpSpPr>
-      <p:grpSpPr>
-        <a:xfrm>
-          <a:off x="0" y="0"/>
-          <a:ext cx="0" cy="0"/>
-          <a:chOff x="0" y="0"/>
-          <a:chExt cx="0" cy="0"/>
-        </a:xfrm>
-      </p:grpSpPr>
-      <p:sp>
-        <p:nvSpPr>
-          <p:cNvPr id="2" name="Title 1">
-            <a:extLst>
-              <a:ext uri="{FF2B5EF4-FFF2-40B4-BE49-F238E27FC236}">
                 <a16:creationId xmlns:a16="http://schemas.microsoft.com/office/drawing/2014/main" id="{F8883020-EAD8-4778-837E-0C0F90381278}"/>
               </a:ext>
             </a:extLst>
@@ -8493,21 +8703,33 @@
         <p:spPr/>
         <p:txBody>
           <a:bodyPr>
-            <a:normAutofit lnSpcReduction="10000"/>
+            <a:normAutofit fontScale="92500" lnSpcReduction="20000"/>
           </a:bodyPr>
           <a:lstStyle/>
           <a:p>
             <a:r>
               <a:rPr lang="en-US" dirty="0"/>
-              <a:t>Minimize inference cost on the challenging and well known </a:t>
-            </a:r>
-            <a:r>
-              <a:rPr lang="en-US" dirty="0" err="1"/>
+              <a:t>Minimize </a:t>
+            </a:r>
+            <a:r>
+              <a:rPr lang="en-US" b="1" dirty="0"/>
+              <a:t>inference cost </a:t>
+            </a:r>
+            <a:r>
+              <a:rPr lang="en-US" dirty="0"/>
+              <a:t>on the challenging and well known </a:t>
+            </a:r>
+            <a:r>
+              <a:rPr lang="en-US" b="1" dirty="0" err="1"/>
               <a:t>RadioML</a:t>
             </a:r>
             <a:r>
-              <a:rPr lang="en-US" dirty="0"/>
-              <a:t> 2018 dataset</a:t>
+              <a:rPr lang="en-US" b="1" dirty="0"/>
+              <a:t> 2018 </a:t>
+            </a:r>
+            <a:r>
+              <a:rPr lang="en-US" dirty="0"/>
+              <a:t>dataset</a:t>
             </a:r>
           </a:p>
           <a:p>
@@ -8538,7 +8760,7 @@
               <a:t> Solutions of </a:t>
             </a:r>
             <a:r>
-              <a:rPr lang="en-US" dirty="0" err="1"/>
+              <a:rPr lang="en-US" b="1" dirty="0" err="1"/>
               <a:t>Aaronica</a:t>
             </a:r>
             <a:r>
@@ -8556,12 +8778,30 @@
               <a:t> Initial round: Pruning </a:t>
             </a:r>
             <a:r>
-              <a:rPr lang="en-US" dirty="0" err="1"/>
+              <a:rPr lang="en-US" b="1" dirty="0" err="1"/>
               <a:t>MobileNet</a:t>
             </a:r>
             <a:r>
               <a:rPr lang="en-US" dirty="0"/>
               <a:t> </a:t>
+            </a:r>
+          </a:p>
+          <a:p>
+            <a:pPr lvl="1">
+              <a:buFont typeface="Wingdings" panose="05000000000000000000" pitchFamily="2" charset="2"/>
+              <a:buChar char="§"/>
+            </a:pPr>
+            <a:r>
+              <a:rPr lang="en-US" dirty="0"/>
+              <a:t>Got 3</a:t>
+            </a:r>
+            <a:r>
+              <a:rPr lang="en-US" baseline="30000" dirty="0"/>
+              <a:t>rd</a:t>
+            </a:r>
+            <a:r>
+              <a:rPr lang="en-US" dirty="0"/>
+              <a:t> place</a:t>
             </a:r>
           </a:p>
           <a:p>
@@ -8571,25 +8811,15 @@
             </a:pPr>
             <a:r>
               <a:rPr lang="en-US" dirty="0"/>
-              <a:t> Final round: Designing </a:t>
-            </a:r>
-            <a:r>
-              <a:rPr lang="en-US" dirty="0" err="1"/>
+              <a:t> Final round: </a:t>
+            </a:r>
+            <a:r>
+              <a:rPr lang="en-US" b="1" dirty="0" err="1"/>
               <a:t>AaronNet</a:t>
             </a:r>
             <a:r>
               <a:rPr lang="en-US" dirty="0"/>
               <a:t> Network</a:t>
-            </a:r>
-          </a:p>
-          <a:p>
-            <a:pPr>
-              <a:buFont typeface="Wingdings" panose="05000000000000000000" pitchFamily="2" charset="2"/>
-              <a:buChar char="§"/>
-            </a:pPr>
-            <a:r>
-              <a:rPr lang="en-US" dirty="0"/>
-              <a:t> A potential network for RF domain applications</a:t>
             </a:r>
           </a:p>
           <a:p>
@@ -8598,12 +8828,36 @@
               <a:buChar char="§"/>
             </a:pPr>
             <a:r>
+              <a:rPr lang="en-US" dirty="0" err="1"/>
+              <a:t>Designd</a:t>
+            </a:r>
+            <a:r>
+              <a:rPr lang="en-US" dirty="0"/>
+              <a:t> a specialized DNN after the initial round</a:t>
+            </a:r>
+          </a:p>
+          <a:p>
+            <a:pPr lvl="1">
+              <a:buFont typeface="Wingdings" panose="05000000000000000000" pitchFamily="2" charset="2"/>
+              <a:buChar char="§"/>
+            </a:pPr>
+            <a:r>
+              <a:rPr lang="en-US" dirty="0"/>
+              <a:t> A potential network for RF domain applications</a:t>
+            </a:r>
+          </a:p>
+          <a:p>
+            <a:pPr lvl="2">
+              <a:buFont typeface="Wingdings" panose="05000000000000000000" pitchFamily="2" charset="2"/>
+              <a:buChar char="§"/>
+            </a:pPr>
+            <a:r>
               <a:rPr lang="en-US" dirty="0"/>
               <a:t>Identification of RF-interference</a:t>
             </a:r>
           </a:p>
           <a:p>
-            <a:pPr lvl="1">
+            <a:pPr lvl="2">
               <a:buFont typeface="Wingdings" panose="05000000000000000000" pitchFamily="2" charset="2"/>
               <a:buChar char="§"/>
             </a:pPr>
@@ -8684,7 +8938,7 @@
           <a:p>
             <a:fld id="{6D22F896-40B5-4ADD-8801-0D06FADFA095}" type="slidenum">
               <a:rPr lang="en-US" smtClean="0"/>
-              <a:t>8</a:t>
+              <a:t>7</a:t>
             </a:fld>
             <a:endParaRPr lang="en-US" dirty="0"/>
           </a:p>
@@ -8694,6 +8948,303 @@
     <p:extLst>
       <p:ext uri="{BB962C8B-B14F-4D97-AF65-F5344CB8AC3E}">
         <p14:creationId xmlns:p14="http://schemas.microsoft.com/office/powerpoint/2010/main" val="3482609367"/>
+      </p:ext>
+    </p:extLst>
+  </p:cSld>
+  <p:clrMapOvr>
+    <a:masterClrMapping/>
+  </p:clrMapOvr>
+</p:sld>
+</file>
+
+<file path=ppt/slides/slide8.xml><?xml version="1.0" encoding="utf-8"?>
+<p:sld xmlns:a="http://schemas.openxmlformats.org/drawingml/2006/main" xmlns:r="http://schemas.openxmlformats.org/officeDocument/2006/relationships" xmlns:p="http://schemas.openxmlformats.org/presentationml/2006/main">
+  <p:cSld>
+    <p:spTree>
+      <p:nvGrpSpPr>
+        <p:cNvPr id="1" name=""/>
+        <p:cNvGrpSpPr/>
+        <p:nvPr/>
+      </p:nvGrpSpPr>
+      <p:grpSpPr>
+        <a:xfrm>
+          <a:off x="0" y="0"/>
+          <a:ext cx="0" cy="0"/>
+          <a:chOff x="0" y="0"/>
+          <a:chExt cx="0" cy="0"/>
+        </a:xfrm>
+      </p:grpSpPr>
+      <p:sp>
+        <p:nvSpPr>
+          <p:cNvPr id="2" name="Title 1">
+            <a:extLst>
+              <a:ext uri="{FF2B5EF4-FFF2-40B4-BE49-F238E27FC236}">
+                <a16:creationId xmlns:a16="http://schemas.microsoft.com/office/drawing/2014/main" id="{4F2FB2D6-A03B-45B4-B104-D1A6DA85DB32}"/>
+              </a:ext>
+            </a:extLst>
+          </p:cNvPr>
+          <p:cNvSpPr>
+            <a:spLocks noGrp="1"/>
+          </p:cNvSpPr>
+          <p:nvPr>
+            <p:ph type="title"/>
+          </p:nvPr>
+        </p:nvSpPr>
+        <p:spPr/>
+        <p:txBody>
+          <a:bodyPr/>
+          <a:lstStyle/>
+          <a:p>
+            <a:r>
+              <a:rPr lang="en-US" dirty="0"/>
+              <a:t>Possible DNNs</a:t>
+            </a:r>
+          </a:p>
+        </p:txBody>
+      </p:sp>
+      <p:sp>
+        <p:nvSpPr>
+          <p:cNvPr id="3" name="Content Placeholder 2">
+            <a:extLst>
+              <a:ext uri="{FF2B5EF4-FFF2-40B4-BE49-F238E27FC236}">
+                <a16:creationId xmlns:a16="http://schemas.microsoft.com/office/drawing/2014/main" id="{12027CD1-1B63-4496-BD55-C68EEFA3E19F}"/>
+              </a:ext>
+            </a:extLst>
+          </p:cNvPr>
+          <p:cNvSpPr>
+            <a:spLocks noGrp="1"/>
+          </p:cNvSpPr>
+          <p:nvPr>
+            <p:ph idx="1"/>
+          </p:nvPr>
+        </p:nvSpPr>
+        <p:spPr>
+          <a:xfrm>
+            <a:off x="1146083" y="1911938"/>
+            <a:ext cx="5362130" cy="3924810"/>
+          </a:xfrm>
+        </p:spPr>
+        <p:txBody>
+          <a:bodyPr>
+            <a:normAutofit/>
+          </a:bodyPr>
+          <a:lstStyle/>
+          <a:p>
+            <a:pPr>
+              <a:buFont typeface="Wingdings" panose="05000000000000000000" pitchFamily="2" charset="2"/>
+              <a:buChar char="§"/>
+            </a:pPr>
+            <a:r>
+              <a:rPr lang="en-US" dirty="0"/>
+              <a:t> VGG, Inception, </a:t>
+            </a:r>
+            <a:r>
+              <a:rPr lang="en-US" dirty="0" err="1"/>
+              <a:t>ResNet</a:t>
+            </a:r>
+            <a:r>
+              <a:rPr lang="en-US" dirty="0"/>
+              <a:t>, </a:t>
+            </a:r>
+            <a:r>
+              <a:rPr lang="en-US" dirty="0" err="1"/>
+              <a:t>MobileNet</a:t>
+            </a:r>
+            <a:r>
+              <a:rPr lang="en-US" dirty="0"/>
+              <a:t>, </a:t>
+            </a:r>
+            <a:r>
+              <a:rPr lang="en-US" dirty="0" err="1"/>
+              <a:t>ShuffleNet</a:t>
+            </a:r>
+            <a:endParaRPr lang="en-US" dirty="0"/>
+          </a:p>
+          <a:p>
+            <a:pPr lvl="1">
+              <a:buFont typeface="Wingdings" panose="05000000000000000000" pitchFamily="2" charset="2"/>
+              <a:buChar char="§"/>
+            </a:pPr>
+            <a:r>
+              <a:rPr lang="en-US" dirty="0"/>
+              <a:t> Each networks has innovations to stand out</a:t>
+            </a:r>
+          </a:p>
+          <a:p>
+            <a:pPr lvl="1">
+              <a:buFont typeface="Wingdings" panose="05000000000000000000" pitchFamily="2" charset="2"/>
+              <a:buChar char="§"/>
+            </a:pPr>
+            <a:endParaRPr lang="en-US" dirty="0"/>
+          </a:p>
+          <a:p>
+            <a:pPr lvl="1">
+              <a:buFont typeface="Wingdings" panose="05000000000000000000" pitchFamily="2" charset="2"/>
+              <a:buChar char="§"/>
+            </a:pPr>
+            <a:endParaRPr lang="en-US" dirty="0"/>
+          </a:p>
+          <a:p>
+            <a:pPr lvl="1">
+              <a:buFont typeface="Wingdings" panose="05000000000000000000" pitchFamily="2" charset="2"/>
+              <a:buChar char="§"/>
+            </a:pPr>
+            <a:endParaRPr lang="en-US" dirty="0"/>
+          </a:p>
+          <a:p>
+            <a:pPr marL="201168" lvl="1" indent="0">
+              <a:buNone/>
+            </a:pPr>
+            <a:endParaRPr lang="en-US" dirty="0"/>
+          </a:p>
+          <a:p>
+            <a:pPr marL="201168" lvl="1" indent="0">
+              <a:buNone/>
+            </a:pPr>
+            <a:r>
+              <a:rPr lang="en-US" b="1" dirty="0" err="1"/>
+              <a:t>MobileNet</a:t>
+            </a:r>
+            <a:endParaRPr lang="en-US" b="1" dirty="0"/>
+          </a:p>
+          <a:p>
+            <a:pPr>
+              <a:buFont typeface="Wingdings" panose="05000000000000000000" pitchFamily="2" charset="2"/>
+              <a:buChar char="§"/>
+            </a:pPr>
+            <a:r>
+              <a:rPr lang="en-US" dirty="0"/>
+              <a:t> Pointwise and depth-wise convolution</a:t>
+            </a:r>
+          </a:p>
+          <a:p>
+            <a:pPr lvl="1">
+              <a:buFont typeface="Wingdings" panose="05000000000000000000" pitchFamily="2" charset="2"/>
+              <a:buChar char="§"/>
+            </a:pPr>
+            <a:r>
+              <a:rPr lang="en-US" dirty="0"/>
+              <a:t>Reducing the number of multiplications</a:t>
+            </a:r>
+          </a:p>
+          <a:p>
+            <a:pPr lvl="1">
+              <a:buFont typeface="Wingdings" panose="05000000000000000000" pitchFamily="2" charset="2"/>
+              <a:buChar char="§"/>
+            </a:pPr>
+            <a:r>
+              <a:rPr lang="en-US" dirty="0"/>
+              <a:t>Higher </a:t>
+            </a:r>
+            <a:r>
+              <a:rPr lang="en-US" b="1" dirty="0"/>
+              <a:t>throughput</a:t>
+            </a:r>
+            <a:r>
+              <a:rPr lang="en-US" dirty="0"/>
+              <a:t> with lower </a:t>
+            </a:r>
+            <a:r>
+              <a:rPr lang="en-US" b="1" dirty="0"/>
+              <a:t>computation cost</a:t>
+            </a:r>
+          </a:p>
+          <a:p>
+            <a:pPr lvl="1">
+              <a:buFont typeface="Wingdings" panose="05000000000000000000" pitchFamily="2" charset="2"/>
+              <a:buChar char="§"/>
+            </a:pPr>
+            <a:endParaRPr lang="en-US" dirty="0"/>
+          </a:p>
+          <a:p>
+            <a:pPr lvl="1">
+              <a:buFont typeface="Wingdings" panose="05000000000000000000" pitchFamily="2" charset="2"/>
+              <a:buChar char="§"/>
+            </a:pPr>
+            <a:endParaRPr lang="en-US" dirty="0"/>
+          </a:p>
+        </p:txBody>
+      </p:sp>
+      <p:pic>
+        <p:nvPicPr>
+          <p:cNvPr id="1026" name="Picture 2" descr="Review: Xception — With Depthwise Separable Convolution, Better Than  Inception-v3 (Image Classification) | by Sik-Ho Tsang | Towards Data Science">
+            <a:extLst>
+              <a:ext uri="{FF2B5EF4-FFF2-40B4-BE49-F238E27FC236}">
+                <a16:creationId xmlns:a16="http://schemas.microsoft.com/office/drawing/2014/main" id="{33DD17A2-CBF2-4CB3-9E69-CE470A4FA5F0}"/>
+              </a:ext>
+            </a:extLst>
+          </p:cNvPr>
+          <p:cNvPicPr>
+            <a:picLocks noChangeAspect="1" noChangeArrowheads="1"/>
+          </p:cNvPicPr>
+          <p:nvPr/>
+        </p:nvPicPr>
+        <p:blipFill>
+          <a:blip r:embed="rId3">
+            <a:extLst>
+              <a:ext uri="{28A0092B-C50C-407E-A947-70E740481C1C}">
+                <a14:useLocalDpi xmlns:a14="http://schemas.microsoft.com/office/drawing/2010/main" val="0"/>
+              </a:ext>
+            </a:extLst>
+          </a:blip>
+          <a:srcRect/>
+          <a:stretch>
+            <a:fillRect/>
+          </a:stretch>
+        </p:blipFill>
+        <p:spPr bwMode="auto">
+          <a:xfrm>
+            <a:off x="6096000" y="2426039"/>
+            <a:ext cx="4905154" cy="3501245"/>
+          </a:xfrm>
+          <a:prstGeom prst="rect">
+            <a:avLst/>
+          </a:prstGeom>
+          <a:noFill/>
+          <a:extLst>
+            <a:ext uri="{909E8E84-426E-40DD-AFC4-6F175D3DCCD1}">
+              <a14:hiddenFill xmlns:a14="http://schemas.microsoft.com/office/drawing/2010/main">
+                <a:solidFill>
+                  <a:srgbClr val="FFFFFF"/>
+                </a:solidFill>
+              </a14:hiddenFill>
+            </a:ext>
+          </a:extLst>
+        </p:spPr>
+      </p:pic>
+      <p:sp>
+        <p:nvSpPr>
+          <p:cNvPr id="5" name="Slide Number Placeholder 4">
+            <a:extLst>
+              <a:ext uri="{FF2B5EF4-FFF2-40B4-BE49-F238E27FC236}">
+                <a16:creationId xmlns:a16="http://schemas.microsoft.com/office/drawing/2014/main" id="{A8E715FD-B778-4967-AE51-EFAE44629622}"/>
+              </a:ext>
+            </a:extLst>
+          </p:cNvPr>
+          <p:cNvSpPr>
+            <a:spLocks noGrp="1"/>
+          </p:cNvSpPr>
+          <p:nvPr>
+            <p:ph type="sldNum" sz="quarter" idx="12"/>
+          </p:nvPr>
+        </p:nvSpPr>
+        <p:spPr/>
+        <p:txBody>
+          <a:bodyPr/>
+          <a:lstStyle/>
+          <a:p>
+            <a:fld id="{6D22F896-40B5-4ADD-8801-0D06FADFA095}" type="slidenum">
+              <a:rPr lang="en-US" smtClean="0"/>
+              <a:t>8</a:t>
+            </a:fld>
+            <a:endParaRPr lang="en-US" dirty="0"/>
+          </a:p>
+        </p:txBody>
+      </p:sp>
+    </p:spTree>
+    <p:extLst>
+      <p:ext uri="{BB962C8B-B14F-4D97-AF65-F5344CB8AC3E}">
+        <p14:creationId xmlns:p14="http://schemas.microsoft.com/office/powerpoint/2010/main" val="1438874182"/>
       </p:ext>
     </p:extLst>
   </p:cSld>
@@ -8742,7 +9293,7 @@
           <a:lstStyle/>
           <a:p>
             <a:r>
-              <a:rPr lang="en-US" dirty="0" err="1"/>
+              <a:rPr lang="en-US"/>
               <a:t>AaronNet</a:t>
             </a:r>
             <a:endParaRPr lang="en-US" dirty="0"/>
@@ -8801,7 +9352,15 @@
             </a:pPr>
             <a:r>
               <a:rPr lang="en-US" dirty="0"/>
-              <a:t> Introducing Multi-Scale Convolutional (MSC) layer</a:t>
+              <a:t> Introducing </a:t>
+            </a:r>
+            <a:r>
+              <a:rPr lang="en-US" b="1" dirty="0"/>
+              <a:t>Multi-Scale Convolutional (MSC) </a:t>
+            </a:r>
+            <a:r>
+              <a:rPr lang="en-US" dirty="0"/>
+              <a:t>layer</a:t>
             </a:r>
           </a:p>
           <a:p>
@@ -8811,7 +9370,7 @@
             </a:pPr>
             <a:r>
               <a:rPr lang="en-US" dirty="0"/>
-              <a:t>Customized for RF signal input</a:t>
+              <a:t>Specialized for RF signal input</a:t>
             </a:r>
           </a:p>
           <a:p>
@@ -8821,17 +9380,80 @@
             </a:pPr>
             <a:r>
               <a:rPr lang="en-US" dirty="0"/>
-              <a:t>Adaptive Max Pooling</a:t>
-            </a:r>
+              <a:t> Adaptive Max Pooling</a:t>
+            </a:r>
+          </a:p>
+          <a:p>
+            <a:pPr>
+              <a:buFont typeface="Wingdings" panose="05000000000000000000" pitchFamily="2" charset="2"/>
+              <a:buChar char="§"/>
+            </a:pPr>
+            <a:r>
+              <a:rPr lang="en-US" dirty="0"/>
+              <a:t> </a:t>
+            </a:r>
+            <a:r>
+              <a:rPr lang="en-US" b="1" dirty="0"/>
+              <a:t>Variations</a:t>
+            </a:r>
+          </a:p>
+          <a:p>
+            <a:pPr lvl="1">
+              <a:buFont typeface="Wingdings" panose="05000000000000000000" pitchFamily="2" charset="2"/>
+              <a:buChar char="§"/>
+            </a:pPr>
+            <a:r>
+              <a:rPr lang="en-US" dirty="0"/>
+              <a:t>AaronNet32: 32 filters</a:t>
+            </a:r>
+          </a:p>
+          <a:p>
+            <a:pPr lvl="1">
+              <a:buFont typeface="Wingdings" panose="05000000000000000000" pitchFamily="2" charset="2"/>
+              <a:buChar char="§"/>
+            </a:pPr>
+            <a:r>
+              <a:rPr lang="en-US" dirty="0"/>
+              <a:t>AaronNet48: 48 filters</a:t>
+            </a:r>
+          </a:p>
+        </p:txBody>
+      </p:sp>
+      <p:sp>
+        <p:nvSpPr>
+          <p:cNvPr id="7" name="Slide Number Placeholder 6">
+            <a:extLst>
+              <a:ext uri="{FF2B5EF4-FFF2-40B4-BE49-F238E27FC236}">
+                <a16:creationId xmlns:a16="http://schemas.microsoft.com/office/drawing/2014/main" id="{A14E269C-AC4F-4562-A80D-0CA1A371627E}"/>
+              </a:ext>
+            </a:extLst>
+          </p:cNvPr>
+          <p:cNvSpPr>
+            <a:spLocks noGrp="1"/>
+          </p:cNvSpPr>
+          <p:nvPr>
+            <p:ph type="sldNum" sz="quarter" idx="12"/>
+          </p:nvPr>
+        </p:nvSpPr>
+        <p:spPr/>
+        <p:txBody>
+          <a:bodyPr/>
+          <a:lstStyle/>
+          <a:p>
+            <a:fld id="{6D22F896-40B5-4ADD-8801-0D06FADFA095}" type="slidenum">
+              <a:rPr lang="en-US" smtClean="0"/>
+              <a:t>9</a:t>
+            </a:fld>
+            <a:endParaRPr lang="en-US" dirty="0"/>
           </a:p>
         </p:txBody>
       </p:sp>
       <p:pic>
         <p:nvPicPr>
-          <p:cNvPr id="5" name="Picture 4">
+          <p:cNvPr id="4" name="Picture 3">
             <a:extLst>
               <a:ext uri="{FF2B5EF4-FFF2-40B4-BE49-F238E27FC236}">
-                <a16:creationId xmlns:a16="http://schemas.microsoft.com/office/drawing/2014/main" id="{72BC67A2-F2A7-409A-9FB4-21516F3A4E68}"/>
+                <a16:creationId xmlns:a16="http://schemas.microsoft.com/office/drawing/2014/main" id="{7E00B865-B5D2-CE43-8CE8-C5313ABF9E6A}"/>
               </a:ext>
             </a:extLst>
           </p:cNvPr>
@@ -8848,8 +9470,8 @@
         </p:blipFill>
         <p:spPr>
           <a:xfrm>
-            <a:off x="6743273" y="1845734"/>
-            <a:ext cx="4763784" cy="4461387"/>
+            <a:off x="6567284" y="193746"/>
+            <a:ext cx="5345590" cy="5264421"/>
           </a:xfrm>
           <a:prstGeom prst="rect">
             <a:avLst/>
@@ -8858,30 +9480,41 @@
       </p:pic>
       <p:sp>
         <p:nvSpPr>
-          <p:cNvPr id="7" name="Slide Number Placeholder 6">
+          <p:cNvPr id="6" name="TextBox 5">
             <a:extLst>
               <a:ext uri="{FF2B5EF4-FFF2-40B4-BE49-F238E27FC236}">
-                <a16:creationId xmlns:a16="http://schemas.microsoft.com/office/drawing/2014/main" id="{A14E269C-AC4F-4562-A80D-0CA1A371627E}"/>
+                <a16:creationId xmlns:a16="http://schemas.microsoft.com/office/drawing/2014/main" id="{D850789F-F095-7644-90DA-908528BAA1C5}"/>
               </a:ext>
             </a:extLst>
           </p:cNvPr>
-          <p:cNvSpPr>
-            <a:spLocks noGrp="1"/>
-          </p:cNvSpPr>
-          <p:nvPr>
-            <p:ph type="sldNum" sz="quarter" idx="12"/>
-          </p:nvPr>
-        </p:nvSpPr>
-        <p:spPr/>
-        <p:txBody>
-          <a:bodyPr/>
-          <a:lstStyle/>
-          <a:p>
-            <a:fld id="{6D22F896-40B5-4ADD-8801-0D06FADFA095}" type="slidenum">
-              <a:rPr lang="en-US" smtClean="0"/>
-              <a:t>9</a:t>
-            </a:fld>
-            <a:endParaRPr lang="en-US" dirty="0"/>
+          <p:cNvSpPr txBox="1"/>
+          <p:nvPr/>
+        </p:nvSpPr>
+        <p:spPr>
+          <a:xfrm>
+            <a:off x="8278237" y="5544766"/>
+            <a:ext cx="3005847" cy="369332"/>
+          </a:xfrm>
+          <a:prstGeom prst="rect">
+            <a:avLst/>
+          </a:prstGeom>
+          <a:noFill/>
+        </p:spPr>
+        <p:txBody>
+          <a:bodyPr wrap="square" rtlCol="0">
+            <a:spAutoFit/>
+          </a:bodyPr>
+          <a:lstStyle/>
+          <a:p>
+            <a:pPr algn="ctr"/>
+            <a:r>
+              <a:rPr lang="en-US" dirty="0" err="1"/>
+              <a:t>AaronNet</a:t>
+            </a:r>
+            <a:r>
+              <a:rPr lang="en-US" dirty="0"/>
+              <a:t> Architecture</a:t>
+            </a:r>
           </a:p>
         </p:txBody>
       </p:sp>
@@ -9780,6 +10413,15 @@
 </file>
 
 <file path=customXml/item2.xml><?xml version="1.0" encoding="utf-8"?>
+<?mso-contentType ?>
+<FormTemplates xmlns="http://schemas.microsoft.com/sharepoint/v3/contenttype/forms">
+  <Display>DocumentLibraryForm</Display>
+  <Edit>DocumentLibraryForm</Edit>
+  <New>DocumentLibraryForm</New>
+</FormTemplates>
+</file>
+
+<file path=customXml/item3.xml><?xml version="1.0" encoding="utf-8"?>
 <ct:contentTypeSchema xmlns:ct="http://schemas.microsoft.com/office/2006/metadata/contentType" xmlns:ma="http://schemas.microsoft.com/office/2006/metadata/properties/metaAttributes" ct:_="" ma:_="" ma:contentTypeName="Document" ma:contentTypeID="0x01010079F111ED35F8CC479449609E8A0923A6" ma:contentTypeVersion="11" ma:contentTypeDescription="Create a new document." ma:contentTypeScope="" ma:versionID="96291512c1ee715ab617f4c07df79fc1">
   <xsd:schema xmlns:xsd="http://www.w3.org/2001/XMLSchema" xmlns:xs="http://www.w3.org/2001/XMLSchema" xmlns:p="http://schemas.microsoft.com/office/2006/metadata/properties" xmlns:ns2="71af3243-3dd4-4a8d-8c0d-dd76da1f02a5" xmlns:ns3="16c05727-aa75-4e4a-9b5f-8a80a1165891" targetNamespace="http://schemas.microsoft.com/office/2006/metadata/properties" ma:root="true" ma:fieldsID="8256c27c40ca5c40ce1cf6c44f0205df" ns2:_="" ns3:_="">
     <xsd:import namespace="71af3243-3dd4-4a8d-8c0d-dd76da1f02a5"/>
@@ -9990,15 +10632,6 @@
 </ct:contentTypeSchema>
 </file>
 
-<file path=customXml/item3.xml><?xml version="1.0" encoding="utf-8"?>
-<?mso-contentType ?>
-<FormTemplates xmlns="http://schemas.microsoft.com/sharepoint/v3/contenttype/forms">
-  <Display>DocumentLibraryForm</Display>
-  <Edit>DocumentLibraryForm</Edit>
-  <New>DocumentLibraryForm</New>
-</FormTemplates>
-</file>
-
 <file path=customXml/itemProps1.xml><?xml version="1.0" encoding="utf-8"?>
 <ds:datastoreItem xmlns:ds="http://schemas.openxmlformats.org/officeDocument/2006/customXml" ds:itemID="{E7866CFD-F94E-4AE5-ACEA-86FEC0F48A10}">
   <ds:schemaRefs>
@@ -10010,6 +10643,14 @@
 </file>
 
 <file path=customXml/itemProps2.xml><?xml version="1.0" encoding="utf-8"?>
+<ds:datastoreItem xmlns:ds="http://schemas.openxmlformats.org/officeDocument/2006/customXml" ds:itemID="{B579702B-25C7-40D7-9E29-7686B11A9660}">
+  <ds:schemaRefs>
+    <ds:schemaRef ds:uri="http://schemas.microsoft.com/sharepoint/v3/contenttype/forms"/>
+  </ds:schemaRefs>
+</ds:datastoreItem>
+</file>
+
+<file path=customXml/itemProps3.xml><?xml version="1.0" encoding="utf-8"?>
 <ds:datastoreItem xmlns:ds="http://schemas.openxmlformats.org/officeDocument/2006/customXml" ds:itemID="{A7C0B241-13E5-418D-8920-D23491E2D2C0}">
   <ds:schemaRefs>
     <ds:schemaRef ds:uri="http://schemas.microsoft.com/office/2006/metadata/contentType"/>
@@ -10026,12 +10667,4 @@
     <ds:schemaRef ds:uri="http://schemas.microsoft.com/internal/obd"/>
   </ds:schemaRefs>
 </ds:datastoreItem>
-</file>
-
-<file path=customXml/itemProps3.xml><?xml version="1.0" encoding="utf-8"?>
-<ds:datastoreItem xmlns:ds="http://schemas.openxmlformats.org/officeDocument/2006/customXml" ds:itemID="{B579702B-25C7-40D7-9E29-7686B11A9660}">
-  <ds:schemaRefs>
-    <ds:schemaRef ds:uri="http://schemas.microsoft.com/sharepoint/v3/contenttype/forms"/>
-  </ds:schemaRefs>
-</ds:datastoreItem>
 </file>
</xml_diff>